<commit_message>
grading function change to fix the puzzle generator issues and minor CLI bug fixes
</commit_message>
<xml_diff>
--- a/Sudoku/Sudoku  solving the puzzle validating uniqnuess.pptx
+++ b/Sudoku/Sudoku  solving the puzzle validating uniqnuess.pptx
@@ -7,8 +7,10 @@
   <p:sldIdLst>
     <p:sldId id="256" r:id="rId2"/>
     <p:sldId id="257" r:id="rId3"/>
-    <p:sldId id="258" r:id="rId4"/>
-    <p:sldId id="259" r:id="rId5"/>
+    <p:sldId id="260" r:id="rId4"/>
+    <p:sldId id="261" r:id="rId5"/>
+    <p:sldId id="258" r:id="rId6"/>
+    <p:sldId id="259" r:id="rId7"/>
   </p:sldIdLst>
   <p:sldSz cx="9144000" cy="6858000" type="screen4x3"/>
   <p:notesSz cx="6858000" cy="9144000"/>
@@ -291,7 +293,7 @@
           <a:p>
             <a:fld id="{A1E2C6C5-A207-4B71-89A7-4AB74899EBC0}" type="datetimeFigureOut">
               <a:rPr lang="en-US" smtClean="0"/>
-              <a:t>9/21/2015</a:t>
+              <a:t>9/22/2015</a:t>
             </a:fld>
             <a:endParaRPr lang="en-US"/>
           </a:p>
@@ -461,7 +463,7 @@
           <a:p>
             <a:fld id="{A1E2C6C5-A207-4B71-89A7-4AB74899EBC0}" type="datetimeFigureOut">
               <a:rPr lang="en-US" smtClean="0"/>
-              <a:t>9/21/2015</a:t>
+              <a:t>9/22/2015</a:t>
             </a:fld>
             <a:endParaRPr lang="en-US"/>
           </a:p>
@@ -641,7 +643,7 @@
           <a:p>
             <a:fld id="{A1E2C6C5-A207-4B71-89A7-4AB74899EBC0}" type="datetimeFigureOut">
               <a:rPr lang="en-US" smtClean="0"/>
-              <a:t>9/21/2015</a:t>
+              <a:t>9/22/2015</a:t>
             </a:fld>
             <a:endParaRPr lang="en-US"/>
           </a:p>
@@ -811,7 +813,7 @@
           <a:p>
             <a:fld id="{A1E2C6C5-A207-4B71-89A7-4AB74899EBC0}" type="datetimeFigureOut">
               <a:rPr lang="en-US" smtClean="0"/>
-              <a:t>9/21/2015</a:t>
+              <a:t>9/22/2015</a:t>
             </a:fld>
             <a:endParaRPr lang="en-US"/>
           </a:p>
@@ -1057,7 +1059,7 @@
           <a:p>
             <a:fld id="{A1E2C6C5-A207-4B71-89A7-4AB74899EBC0}" type="datetimeFigureOut">
               <a:rPr lang="en-US" smtClean="0"/>
-              <a:t>9/21/2015</a:t>
+              <a:t>9/22/2015</a:t>
             </a:fld>
             <a:endParaRPr lang="en-US"/>
           </a:p>
@@ -1345,7 +1347,7 @@
           <a:p>
             <a:fld id="{A1E2C6C5-A207-4B71-89A7-4AB74899EBC0}" type="datetimeFigureOut">
               <a:rPr lang="en-US" smtClean="0"/>
-              <a:t>9/21/2015</a:t>
+              <a:t>9/22/2015</a:t>
             </a:fld>
             <a:endParaRPr lang="en-US"/>
           </a:p>
@@ -1767,7 +1769,7 @@
           <a:p>
             <a:fld id="{A1E2C6C5-A207-4B71-89A7-4AB74899EBC0}" type="datetimeFigureOut">
               <a:rPr lang="en-US" smtClean="0"/>
-              <a:t>9/21/2015</a:t>
+              <a:t>9/22/2015</a:t>
             </a:fld>
             <a:endParaRPr lang="en-US"/>
           </a:p>
@@ -1885,7 +1887,7 @@
           <a:p>
             <a:fld id="{A1E2C6C5-A207-4B71-89A7-4AB74899EBC0}" type="datetimeFigureOut">
               <a:rPr lang="en-US" smtClean="0"/>
-              <a:t>9/21/2015</a:t>
+              <a:t>9/22/2015</a:t>
             </a:fld>
             <a:endParaRPr lang="en-US"/>
           </a:p>
@@ -1980,7 +1982,7 @@
           <a:p>
             <a:fld id="{A1E2C6C5-A207-4B71-89A7-4AB74899EBC0}" type="datetimeFigureOut">
               <a:rPr lang="en-US" smtClean="0"/>
-              <a:t>9/21/2015</a:t>
+              <a:t>9/22/2015</a:t>
             </a:fld>
             <a:endParaRPr lang="en-US"/>
           </a:p>
@@ -2257,7 +2259,7 @@
           <a:p>
             <a:fld id="{A1E2C6C5-A207-4B71-89A7-4AB74899EBC0}" type="datetimeFigureOut">
               <a:rPr lang="en-US" smtClean="0"/>
-              <a:t>9/21/2015</a:t>
+              <a:t>9/22/2015</a:t>
             </a:fld>
             <a:endParaRPr lang="en-US"/>
           </a:p>
@@ -2510,7 +2512,7 @@
           <a:p>
             <a:fld id="{A1E2C6C5-A207-4B71-89A7-4AB74899EBC0}" type="datetimeFigureOut">
               <a:rPr lang="en-US" smtClean="0"/>
-              <a:t>9/21/2015</a:t>
+              <a:t>9/22/2015</a:t>
             </a:fld>
             <a:endParaRPr lang="en-US"/>
           </a:p>
@@ -2723,7 +2725,7 @@
           <a:p>
             <a:fld id="{A1E2C6C5-A207-4B71-89A7-4AB74899EBC0}" type="datetimeFigureOut">
               <a:rPr lang="en-US" smtClean="0"/>
-              <a:t>9/21/2015</a:t>
+              <a:t>9/22/2015</a:t>
             </a:fld>
             <a:endParaRPr lang="en-US"/>
           </a:p>
@@ -3221,837 +3223,983 @@
           </a:p>
         </p:txBody>
       </p:sp>
-      <p:sp>
-        <p:nvSpPr>
-          <p:cNvPr id="4" name="Oval 3"/>
-          <p:cNvSpPr/>
+      <p:grpSp>
+        <p:nvGrpSpPr>
+          <p:cNvPr id="33" name="Group 32"/>
+          <p:cNvGrpSpPr/>
           <p:nvPr/>
-        </p:nvSpPr>
-        <p:spPr>
+        </p:nvGrpSpPr>
+        <p:grpSpPr>
           <a:xfrm>
-            <a:off x="3733800" y="1323975"/>
-            <a:ext cx="304800" cy="381000"/>
+            <a:off x="1371600" y="1323975"/>
+            <a:ext cx="4267200" cy="2943225"/>
+            <a:chOff x="1371600" y="1323975"/>
+            <a:chExt cx="4267200" cy="2943225"/>
           </a:xfrm>
-          <a:prstGeom prst="ellipse">
-            <a:avLst/>
-          </a:prstGeom>
-          <a:solidFill>
-            <a:schemeClr val="accent1">
-              <a:lumMod val="40000"/>
-              <a:lumOff val="60000"/>
-            </a:schemeClr>
-          </a:solidFill>
-        </p:spPr>
-        <p:style>
-          <a:lnRef idx="2">
-            <a:schemeClr val="accent1">
-              <a:shade val="50000"/>
-            </a:schemeClr>
-          </a:lnRef>
-          <a:fillRef idx="1">
-            <a:schemeClr val="accent1"/>
-          </a:fillRef>
-          <a:effectRef idx="0">
-            <a:schemeClr val="accent1"/>
-          </a:effectRef>
-          <a:fontRef idx="minor">
-            <a:schemeClr val="lt1"/>
-          </a:fontRef>
-        </p:style>
-        <p:txBody>
-          <a:bodyPr rtlCol="0" anchor="ctr"/>
-          <a:lstStyle/>
-          <a:p>
-            <a:pPr algn="ctr"/>
-            <a:r>
-              <a:rPr lang="en-US" dirty="0" smtClean="0"/>
-              <a:t>1</a:t>
-            </a:r>
-            <a:endParaRPr lang="en-US" dirty="0"/>
-          </a:p>
-        </p:txBody>
-      </p:sp>
-      <p:sp>
-        <p:nvSpPr>
-          <p:cNvPr id="10" name="Oval 9"/>
-          <p:cNvSpPr/>
-          <p:nvPr/>
-        </p:nvSpPr>
-        <p:spPr>
-          <a:xfrm>
-            <a:off x="2943225" y="2190750"/>
-            <a:ext cx="304800" cy="381000"/>
-          </a:xfrm>
-          <a:prstGeom prst="ellipse">
-            <a:avLst/>
-          </a:prstGeom>
-          <a:solidFill>
-            <a:schemeClr val="accent1">
-              <a:lumMod val="40000"/>
-              <a:lumOff val="60000"/>
-            </a:schemeClr>
-          </a:solidFill>
-        </p:spPr>
-        <p:style>
-          <a:lnRef idx="2">
-            <a:schemeClr val="accent1">
-              <a:shade val="50000"/>
-            </a:schemeClr>
-          </a:lnRef>
-          <a:fillRef idx="1">
-            <a:schemeClr val="accent1"/>
-          </a:fillRef>
-          <a:effectRef idx="0">
-            <a:schemeClr val="accent1"/>
-          </a:effectRef>
-          <a:fontRef idx="minor">
-            <a:schemeClr val="lt1"/>
-          </a:fontRef>
-        </p:style>
-        <p:txBody>
-          <a:bodyPr rtlCol="0" anchor="ctr"/>
-          <a:lstStyle/>
-          <a:p>
-            <a:pPr algn="ctr"/>
-            <a:r>
-              <a:rPr lang="en-US" dirty="0" smtClean="0"/>
-              <a:t>2</a:t>
-            </a:r>
-            <a:endParaRPr lang="en-US" dirty="0"/>
-          </a:p>
-        </p:txBody>
-      </p:sp>
-      <p:sp>
-        <p:nvSpPr>
-          <p:cNvPr id="11" name="Oval 10"/>
-          <p:cNvSpPr/>
-          <p:nvPr/>
-        </p:nvSpPr>
-        <p:spPr>
-          <a:xfrm>
-            <a:off x="2147886" y="3086100"/>
-            <a:ext cx="304800" cy="381000"/>
-          </a:xfrm>
-          <a:prstGeom prst="ellipse">
-            <a:avLst/>
-          </a:prstGeom>
-          <a:solidFill>
-            <a:schemeClr val="accent1">
-              <a:lumMod val="40000"/>
-              <a:lumOff val="60000"/>
-            </a:schemeClr>
-          </a:solidFill>
-        </p:spPr>
-        <p:style>
-          <a:lnRef idx="2">
-            <a:schemeClr val="accent1">
-              <a:shade val="50000"/>
-            </a:schemeClr>
-          </a:lnRef>
-          <a:fillRef idx="1">
-            <a:schemeClr val="accent1"/>
-          </a:fillRef>
-          <a:effectRef idx="0">
-            <a:schemeClr val="accent1"/>
-          </a:effectRef>
-          <a:fontRef idx="minor">
-            <a:schemeClr val="lt1"/>
-          </a:fontRef>
-        </p:style>
-        <p:txBody>
-          <a:bodyPr rtlCol="0" anchor="ctr"/>
-          <a:lstStyle/>
-          <a:p>
-            <a:pPr algn="ctr"/>
-            <a:r>
-              <a:rPr lang="en-US" dirty="0" smtClean="0"/>
-              <a:t>3</a:t>
-            </a:r>
-            <a:endParaRPr lang="en-US" dirty="0"/>
-          </a:p>
-        </p:txBody>
-      </p:sp>
-      <p:sp>
-        <p:nvSpPr>
-          <p:cNvPr id="12" name="Oval 11"/>
-          <p:cNvSpPr/>
-          <p:nvPr/>
-        </p:nvSpPr>
-        <p:spPr>
-          <a:xfrm>
-            <a:off x="1371600" y="3886200"/>
-            <a:ext cx="304800" cy="381000"/>
-          </a:xfrm>
-          <a:prstGeom prst="ellipse">
-            <a:avLst/>
-          </a:prstGeom>
-          <a:solidFill>
-            <a:schemeClr val="accent1">
-              <a:lumMod val="40000"/>
-              <a:lumOff val="60000"/>
-            </a:schemeClr>
-          </a:solidFill>
-        </p:spPr>
-        <p:style>
-          <a:lnRef idx="2">
-            <a:schemeClr val="accent1">
-              <a:shade val="50000"/>
-            </a:schemeClr>
-          </a:lnRef>
-          <a:fillRef idx="1">
-            <a:schemeClr val="accent1"/>
-          </a:fillRef>
-          <a:effectRef idx="0">
-            <a:schemeClr val="accent1"/>
-          </a:effectRef>
-          <a:fontRef idx="minor">
-            <a:schemeClr val="lt1"/>
-          </a:fontRef>
-        </p:style>
-        <p:txBody>
-          <a:bodyPr rtlCol="0" anchor="ctr"/>
-          <a:lstStyle/>
-          <a:p>
-            <a:pPr algn="ctr"/>
-            <a:r>
-              <a:rPr lang="en-US" dirty="0" smtClean="0"/>
-              <a:t>4</a:t>
-            </a:r>
-            <a:endParaRPr lang="en-US" dirty="0"/>
-          </a:p>
-        </p:txBody>
-      </p:sp>
-      <p:sp>
-        <p:nvSpPr>
-          <p:cNvPr id="13" name="Oval 12"/>
-          <p:cNvSpPr/>
-          <p:nvPr/>
-        </p:nvSpPr>
-        <p:spPr>
-          <a:xfrm>
-            <a:off x="2176462" y="3886200"/>
-            <a:ext cx="304800" cy="381000"/>
-          </a:xfrm>
-          <a:prstGeom prst="ellipse">
-            <a:avLst/>
-          </a:prstGeom>
-          <a:solidFill>
-            <a:schemeClr val="accent1">
-              <a:lumMod val="40000"/>
-              <a:lumOff val="60000"/>
-            </a:schemeClr>
-          </a:solidFill>
-        </p:spPr>
-        <p:style>
-          <a:lnRef idx="2">
-            <a:schemeClr val="accent1">
-              <a:shade val="50000"/>
-            </a:schemeClr>
-          </a:lnRef>
-          <a:fillRef idx="1">
-            <a:schemeClr val="accent1"/>
-          </a:fillRef>
-          <a:effectRef idx="0">
-            <a:schemeClr val="accent1"/>
-          </a:effectRef>
-          <a:fontRef idx="minor">
-            <a:schemeClr val="lt1"/>
-          </a:fontRef>
-        </p:style>
-        <p:txBody>
-          <a:bodyPr rtlCol="0" anchor="ctr"/>
-          <a:lstStyle/>
-          <a:p>
-            <a:pPr algn="ctr"/>
-            <a:r>
-              <a:rPr lang="en-US" dirty="0" smtClean="0"/>
-              <a:t>5</a:t>
-            </a:r>
-            <a:endParaRPr lang="en-US" dirty="0"/>
-          </a:p>
-        </p:txBody>
-      </p:sp>
-      <p:sp>
-        <p:nvSpPr>
-          <p:cNvPr id="14" name="Oval 13"/>
-          <p:cNvSpPr/>
-          <p:nvPr/>
-        </p:nvSpPr>
-        <p:spPr>
-          <a:xfrm>
-            <a:off x="2933700" y="3095625"/>
-            <a:ext cx="304800" cy="381000"/>
-          </a:xfrm>
-          <a:prstGeom prst="ellipse">
-            <a:avLst/>
-          </a:prstGeom>
-          <a:solidFill>
-            <a:schemeClr val="accent1">
-              <a:lumMod val="40000"/>
-              <a:lumOff val="60000"/>
-            </a:schemeClr>
-          </a:solidFill>
-        </p:spPr>
-        <p:style>
-          <a:lnRef idx="2">
-            <a:schemeClr val="accent1">
-              <a:shade val="50000"/>
-            </a:schemeClr>
-          </a:lnRef>
-          <a:fillRef idx="1">
-            <a:schemeClr val="accent1"/>
-          </a:fillRef>
-          <a:effectRef idx="0">
-            <a:schemeClr val="accent1"/>
-          </a:effectRef>
-          <a:fontRef idx="minor">
-            <a:schemeClr val="lt1"/>
-          </a:fontRef>
-        </p:style>
-        <p:txBody>
-          <a:bodyPr rtlCol="0" anchor="ctr"/>
-          <a:lstStyle/>
-          <a:p>
-            <a:pPr algn="ctr"/>
-            <a:r>
-              <a:rPr lang="en-US" dirty="0" smtClean="0"/>
-              <a:t>6</a:t>
-            </a:r>
-            <a:endParaRPr lang="en-US" dirty="0"/>
-          </a:p>
-        </p:txBody>
-      </p:sp>
-      <p:sp>
-        <p:nvSpPr>
-          <p:cNvPr id="15" name="Oval 14"/>
-          <p:cNvSpPr/>
-          <p:nvPr/>
-        </p:nvSpPr>
-        <p:spPr>
-          <a:xfrm>
-            <a:off x="3733800" y="2190750"/>
-            <a:ext cx="304800" cy="381000"/>
-          </a:xfrm>
-          <a:prstGeom prst="ellipse">
-            <a:avLst/>
-          </a:prstGeom>
-          <a:solidFill>
-            <a:schemeClr val="accent1">
-              <a:lumMod val="40000"/>
-              <a:lumOff val="60000"/>
-            </a:schemeClr>
-          </a:solidFill>
-        </p:spPr>
-        <p:style>
-          <a:lnRef idx="2">
-            <a:schemeClr val="accent1">
-              <a:shade val="50000"/>
-            </a:schemeClr>
-          </a:lnRef>
-          <a:fillRef idx="1">
-            <a:schemeClr val="accent1"/>
-          </a:fillRef>
-          <a:effectRef idx="0">
-            <a:schemeClr val="accent1"/>
-          </a:effectRef>
-          <a:fontRef idx="minor">
-            <a:schemeClr val="lt1"/>
-          </a:fontRef>
-        </p:style>
-        <p:txBody>
-          <a:bodyPr rtlCol="0" anchor="ctr"/>
-          <a:lstStyle/>
-          <a:p>
-            <a:pPr algn="ctr"/>
-            <a:r>
-              <a:rPr lang="en-US" dirty="0" smtClean="0"/>
-              <a:t>7</a:t>
-            </a:r>
-            <a:endParaRPr lang="en-US" dirty="0"/>
-          </a:p>
-        </p:txBody>
-      </p:sp>
-      <p:sp>
-        <p:nvSpPr>
-          <p:cNvPr id="16" name="Oval 15"/>
-          <p:cNvSpPr/>
-          <p:nvPr/>
-        </p:nvSpPr>
-        <p:spPr>
-          <a:xfrm>
-            <a:off x="4572000" y="2190750"/>
-            <a:ext cx="304800" cy="381000"/>
-          </a:xfrm>
-          <a:prstGeom prst="ellipse">
-            <a:avLst/>
-          </a:prstGeom>
-          <a:solidFill>
-            <a:schemeClr val="accent1">
-              <a:lumMod val="40000"/>
-              <a:lumOff val="60000"/>
-            </a:schemeClr>
-          </a:solidFill>
-        </p:spPr>
-        <p:style>
-          <a:lnRef idx="2">
-            <a:schemeClr val="accent1">
-              <a:shade val="50000"/>
-            </a:schemeClr>
-          </a:lnRef>
-          <a:fillRef idx="1">
-            <a:schemeClr val="accent1"/>
-          </a:fillRef>
-          <a:effectRef idx="0">
-            <a:schemeClr val="accent1"/>
-          </a:effectRef>
-          <a:fontRef idx="minor">
-            <a:schemeClr val="lt1"/>
-          </a:fontRef>
-        </p:style>
-        <p:txBody>
-          <a:bodyPr rtlCol="0" anchor="ctr"/>
-          <a:lstStyle/>
-          <a:p>
-            <a:pPr algn="ctr"/>
-            <a:r>
-              <a:rPr lang="en-US" dirty="0" smtClean="0"/>
-              <a:t>8</a:t>
-            </a:r>
-            <a:endParaRPr lang="en-US" dirty="0"/>
-          </a:p>
-        </p:txBody>
-      </p:sp>
-      <p:sp>
-        <p:nvSpPr>
-          <p:cNvPr id="17" name="Oval 16"/>
-          <p:cNvSpPr/>
-          <p:nvPr/>
-        </p:nvSpPr>
-        <p:spPr>
-          <a:xfrm>
-            <a:off x="4582160" y="3095625"/>
-            <a:ext cx="304800" cy="381000"/>
-          </a:xfrm>
-          <a:prstGeom prst="ellipse">
-            <a:avLst/>
-          </a:prstGeom>
-          <a:solidFill>
-            <a:schemeClr val="accent1">
-              <a:lumMod val="40000"/>
-              <a:lumOff val="60000"/>
-            </a:schemeClr>
-          </a:solidFill>
-        </p:spPr>
-        <p:style>
-          <a:lnRef idx="2">
-            <a:schemeClr val="accent1">
-              <a:shade val="50000"/>
-            </a:schemeClr>
-          </a:lnRef>
-          <a:fillRef idx="1">
-            <a:schemeClr val="accent1"/>
-          </a:fillRef>
-          <a:effectRef idx="0">
-            <a:schemeClr val="accent1"/>
-          </a:effectRef>
-          <a:fontRef idx="minor">
-            <a:schemeClr val="lt1"/>
-          </a:fontRef>
-        </p:style>
-        <p:txBody>
-          <a:bodyPr rtlCol="0" anchor="ctr"/>
-          <a:lstStyle/>
-          <a:p>
-            <a:pPr algn="ctr"/>
-            <a:r>
-              <a:rPr lang="en-US" dirty="0"/>
-              <a:t>9</a:t>
-            </a:r>
-            <a:endParaRPr lang="en-US" dirty="0"/>
-          </a:p>
-        </p:txBody>
-      </p:sp>
-      <p:sp>
-        <p:nvSpPr>
-          <p:cNvPr id="18" name="Oval 17"/>
-          <p:cNvSpPr/>
-          <p:nvPr/>
-        </p:nvSpPr>
-        <p:spPr>
-          <a:xfrm>
-            <a:off x="4582160" y="3886200"/>
-            <a:ext cx="304800" cy="381000"/>
-          </a:xfrm>
-          <a:prstGeom prst="ellipse">
-            <a:avLst/>
-          </a:prstGeom>
-          <a:solidFill>
-            <a:schemeClr val="accent1">
-              <a:lumMod val="40000"/>
-              <a:lumOff val="60000"/>
-            </a:schemeClr>
-          </a:solidFill>
-        </p:spPr>
-        <p:style>
-          <a:lnRef idx="2">
-            <a:schemeClr val="accent1">
-              <a:shade val="50000"/>
-            </a:schemeClr>
-          </a:lnRef>
-          <a:fillRef idx="1">
-            <a:schemeClr val="accent1"/>
-          </a:fillRef>
-          <a:effectRef idx="0">
-            <a:schemeClr val="accent1"/>
-          </a:effectRef>
-          <a:fontRef idx="minor">
-            <a:schemeClr val="lt1"/>
-          </a:fontRef>
-        </p:style>
-        <p:txBody>
-          <a:bodyPr wrap="none" rtlCol="0" anchor="ctr"/>
-          <a:lstStyle/>
-          <a:p>
-            <a:pPr algn="ctr"/>
-            <a:r>
-              <a:rPr lang="en-US" dirty="0" smtClean="0"/>
-              <a:t>10</a:t>
-            </a:r>
-            <a:endParaRPr lang="en-US" dirty="0"/>
-          </a:p>
-        </p:txBody>
-      </p:sp>
-      <p:sp>
-        <p:nvSpPr>
-          <p:cNvPr id="19" name="Oval 18"/>
-          <p:cNvSpPr/>
-          <p:nvPr/>
-        </p:nvSpPr>
-        <p:spPr>
-          <a:xfrm>
-            <a:off x="5334000" y="3886200"/>
-            <a:ext cx="304800" cy="381000"/>
-          </a:xfrm>
-          <a:prstGeom prst="ellipse">
-            <a:avLst/>
-          </a:prstGeom>
-          <a:solidFill>
-            <a:schemeClr val="accent1">
-              <a:lumMod val="40000"/>
-              <a:lumOff val="60000"/>
-            </a:schemeClr>
-          </a:solidFill>
-        </p:spPr>
-        <p:style>
-          <a:lnRef idx="2">
-            <a:schemeClr val="accent1">
-              <a:shade val="50000"/>
-            </a:schemeClr>
-          </a:lnRef>
-          <a:fillRef idx="1">
-            <a:schemeClr val="accent1"/>
-          </a:fillRef>
-          <a:effectRef idx="0">
-            <a:schemeClr val="accent1"/>
-          </a:effectRef>
-          <a:fontRef idx="minor">
-            <a:schemeClr val="lt1"/>
-          </a:fontRef>
-        </p:style>
-        <p:txBody>
-          <a:bodyPr wrap="none" rtlCol="0" anchor="ctr"/>
-          <a:lstStyle/>
-          <a:p>
-            <a:pPr algn="ctr"/>
-            <a:r>
-              <a:rPr lang="en-US" dirty="0" smtClean="0"/>
-              <a:t>11</a:t>
-            </a:r>
-            <a:endParaRPr lang="en-US" dirty="0"/>
-          </a:p>
-        </p:txBody>
-      </p:sp>
-      <p:sp>
-        <p:nvSpPr>
-          <p:cNvPr id="20" name="Oval 19"/>
-          <p:cNvSpPr/>
-          <p:nvPr/>
-        </p:nvSpPr>
-        <p:spPr>
-          <a:xfrm>
-            <a:off x="5334000" y="3095625"/>
-            <a:ext cx="304800" cy="381000"/>
-          </a:xfrm>
-          <a:prstGeom prst="ellipse">
-            <a:avLst/>
-          </a:prstGeom>
-          <a:solidFill>
-            <a:schemeClr val="accent1">
-              <a:lumMod val="40000"/>
-              <a:lumOff val="60000"/>
-            </a:schemeClr>
-          </a:solidFill>
-        </p:spPr>
-        <p:style>
-          <a:lnRef idx="2">
-            <a:schemeClr val="accent1">
-              <a:shade val="50000"/>
-            </a:schemeClr>
-          </a:lnRef>
-          <a:fillRef idx="1">
-            <a:schemeClr val="accent1"/>
-          </a:fillRef>
-          <a:effectRef idx="0">
-            <a:schemeClr val="accent1"/>
-          </a:effectRef>
-          <a:fontRef idx="minor">
-            <a:schemeClr val="lt1"/>
-          </a:fontRef>
-        </p:style>
-        <p:txBody>
-          <a:bodyPr wrap="none" rtlCol="0" anchor="ctr"/>
-          <a:lstStyle/>
-          <a:p>
-            <a:pPr algn="ctr"/>
-            <a:r>
-              <a:rPr lang="en-US" dirty="0" smtClean="0"/>
-              <a:t>12</a:t>
-            </a:r>
-            <a:endParaRPr lang="en-US" dirty="0"/>
-          </a:p>
-        </p:txBody>
-      </p:sp>
-      <p:cxnSp>
-        <p:nvCxnSpPr>
-          <p:cNvPr id="5" name="Straight Connector 4"/>
-          <p:cNvCxnSpPr>
-            <a:stCxn id="4" idx="3"/>
-            <a:endCxn id="10" idx="7"/>
-          </p:cNvCxnSpPr>
-          <p:nvPr/>
-        </p:nvCxnSpPr>
-        <p:spPr>
-          <a:xfrm flipH="1">
-            <a:off x="3203388" y="1649179"/>
-            <a:ext cx="575049" cy="597367"/>
-          </a:xfrm>
-          <a:prstGeom prst="line">
-            <a:avLst/>
-          </a:prstGeom>
-          <a:ln w="28575"/>
-        </p:spPr>
-        <p:style>
-          <a:lnRef idx="1">
-            <a:schemeClr val="accent1"/>
-          </a:lnRef>
-          <a:fillRef idx="0">
-            <a:schemeClr val="accent1"/>
-          </a:fillRef>
-          <a:effectRef idx="0">
-            <a:schemeClr val="accent1"/>
-          </a:effectRef>
-          <a:fontRef idx="minor">
-            <a:schemeClr val="tx1"/>
-          </a:fontRef>
-        </p:style>
-      </p:cxnSp>
-      <p:cxnSp>
-        <p:nvCxnSpPr>
-          <p:cNvPr id="21" name="Straight Connector 20"/>
-          <p:cNvCxnSpPr>
-            <a:endCxn id="11" idx="7"/>
-          </p:cNvCxnSpPr>
-          <p:nvPr/>
-        </p:nvCxnSpPr>
-        <p:spPr>
-          <a:xfrm flipH="1">
-            <a:off x="2408049" y="2498258"/>
-            <a:ext cx="599367" cy="643638"/>
-          </a:xfrm>
-          <a:prstGeom prst="line">
-            <a:avLst/>
-          </a:prstGeom>
-          <a:ln w="28575"/>
-        </p:spPr>
-        <p:style>
-          <a:lnRef idx="1">
-            <a:schemeClr val="accent1"/>
-          </a:lnRef>
-          <a:fillRef idx="0">
-            <a:schemeClr val="accent1"/>
-          </a:fillRef>
-          <a:effectRef idx="0">
-            <a:schemeClr val="accent1"/>
-          </a:effectRef>
-          <a:fontRef idx="minor">
-            <a:schemeClr val="tx1"/>
-          </a:fontRef>
-        </p:style>
-      </p:cxnSp>
-      <p:cxnSp>
-        <p:nvCxnSpPr>
-          <p:cNvPr id="22" name="Straight Connector 21"/>
-          <p:cNvCxnSpPr/>
-          <p:nvPr/>
-        </p:nvCxnSpPr>
-        <p:spPr>
-          <a:xfrm flipH="1">
-            <a:off x="1616653" y="3352800"/>
-            <a:ext cx="575049" cy="597367"/>
-          </a:xfrm>
-          <a:prstGeom prst="line">
-            <a:avLst/>
-          </a:prstGeom>
-          <a:ln w="28575"/>
-        </p:spPr>
-        <p:style>
-          <a:lnRef idx="1">
-            <a:schemeClr val="accent1"/>
-          </a:lnRef>
-          <a:fillRef idx="0">
-            <a:schemeClr val="accent1"/>
-          </a:fillRef>
-          <a:effectRef idx="0">
-            <a:schemeClr val="accent1"/>
-          </a:effectRef>
-          <a:fontRef idx="minor">
-            <a:schemeClr val="tx1"/>
-          </a:fontRef>
-        </p:style>
-      </p:cxnSp>
-      <p:cxnSp>
-        <p:nvCxnSpPr>
-          <p:cNvPr id="23" name="Straight Connector 22"/>
-          <p:cNvCxnSpPr>
-            <a:endCxn id="13" idx="0"/>
-          </p:cNvCxnSpPr>
-          <p:nvPr/>
-        </p:nvCxnSpPr>
-        <p:spPr>
-          <a:xfrm flipH="1">
-            <a:off x="2328862" y="3476625"/>
-            <a:ext cx="7621" cy="409575"/>
-          </a:xfrm>
-          <a:prstGeom prst="line">
-            <a:avLst/>
-          </a:prstGeom>
-          <a:ln w="28575"/>
-        </p:spPr>
-        <p:style>
-          <a:lnRef idx="1">
-            <a:schemeClr val="accent1"/>
-          </a:lnRef>
-          <a:fillRef idx="0">
-            <a:schemeClr val="accent1"/>
-          </a:fillRef>
-          <a:effectRef idx="0">
-            <a:schemeClr val="accent1"/>
-          </a:effectRef>
-          <a:fontRef idx="minor">
-            <a:schemeClr val="tx1"/>
-          </a:fontRef>
-        </p:style>
-      </p:cxnSp>
-      <p:cxnSp>
-        <p:nvCxnSpPr>
-          <p:cNvPr id="25" name="Straight Connector 24"/>
-          <p:cNvCxnSpPr>
-            <a:endCxn id="14" idx="0"/>
-          </p:cNvCxnSpPr>
-          <p:nvPr/>
-        </p:nvCxnSpPr>
-        <p:spPr>
-          <a:xfrm flipH="1">
-            <a:off x="3086100" y="2571750"/>
-            <a:ext cx="9526" cy="523875"/>
-          </a:xfrm>
-          <a:prstGeom prst="line">
-            <a:avLst/>
-          </a:prstGeom>
-          <a:ln w="28575"/>
-        </p:spPr>
-        <p:style>
-          <a:lnRef idx="1">
-            <a:schemeClr val="accent1"/>
-          </a:lnRef>
-          <a:fillRef idx="0">
-            <a:schemeClr val="accent1"/>
-          </a:fillRef>
-          <a:effectRef idx="0">
-            <a:schemeClr val="accent1"/>
-          </a:effectRef>
-          <a:fontRef idx="minor">
-            <a:schemeClr val="tx1"/>
-          </a:fontRef>
-        </p:style>
-      </p:cxnSp>
-      <p:cxnSp>
-        <p:nvCxnSpPr>
-          <p:cNvPr id="27" name="Straight Connector 26"/>
-          <p:cNvCxnSpPr>
-            <a:endCxn id="15" idx="0"/>
-          </p:cNvCxnSpPr>
-          <p:nvPr/>
-        </p:nvCxnSpPr>
-        <p:spPr>
-          <a:xfrm flipH="1">
-            <a:off x="3886200" y="1711325"/>
-            <a:ext cx="15241" cy="479425"/>
-          </a:xfrm>
-          <a:prstGeom prst="line">
-            <a:avLst/>
-          </a:prstGeom>
-          <a:ln w="28575"/>
-        </p:spPr>
-        <p:style>
-          <a:lnRef idx="1">
-            <a:schemeClr val="accent1"/>
-          </a:lnRef>
-          <a:fillRef idx="0">
-            <a:schemeClr val="accent1"/>
-          </a:fillRef>
-          <a:effectRef idx="0">
-            <a:schemeClr val="accent1"/>
-          </a:effectRef>
-          <a:fontRef idx="minor">
-            <a:schemeClr val="tx1"/>
-          </a:fontRef>
-        </p:style>
-      </p:cxnSp>
-      <p:cxnSp>
-        <p:nvCxnSpPr>
-          <p:cNvPr id="29" name="Straight Connector 28"/>
-          <p:cNvCxnSpPr>
-            <a:stCxn id="16" idx="1"/>
-            <a:endCxn id="4" idx="5"/>
-          </p:cNvCxnSpPr>
-          <p:nvPr/>
-        </p:nvCxnSpPr>
-        <p:spPr>
-          <a:xfrm flipH="1" flipV="1">
-            <a:off x="3993963" y="1649179"/>
-            <a:ext cx="622674" cy="597367"/>
-          </a:xfrm>
-          <a:prstGeom prst="line">
-            <a:avLst/>
-          </a:prstGeom>
-          <a:ln w="28575"/>
-        </p:spPr>
-        <p:style>
-          <a:lnRef idx="1">
-            <a:schemeClr val="accent1"/>
-          </a:lnRef>
-          <a:fillRef idx="0">
-            <a:schemeClr val="accent1"/>
-          </a:fillRef>
-          <a:effectRef idx="0">
-            <a:schemeClr val="accent1"/>
-          </a:effectRef>
-          <a:fontRef idx="minor">
-            <a:schemeClr val="tx1"/>
-          </a:fontRef>
-        </p:style>
-      </p:cxnSp>
+        </p:grpSpPr>
+        <p:sp>
+          <p:nvSpPr>
+            <p:cNvPr id="4" name="Oval 3"/>
+            <p:cNvSpPr/>
+            <p:nvPr/>
+          </p:nvSpPr>
+          <p:spPr>
+            <a:xfrm>
+              <a:off x="3733800" y="1323975"/>
+              <a:ext cx="304800" cy="381000"/>
+            </a:xfrm>
+            <a:prstGeom prst="ellipse">
+              <a:avLst/>
+            </a:prstGeom>
+            <a:solidFill>
+              <a:schemeClr val="accent1">
+                <a:lumMod val="40000"/>
+                <a:lumOff val="60000"/>
+              </a:schemeClr>
+            </a:solidFill>
+          </p:spPr>
+          <p:style>
+            <a:lnRef idx="2">
+              <a:schemeClr val="accent1">
+                <a:shade val="50000"/>
+              </a:schemeClr>
+            </a:lnRef>
+            <a:fillRef idx="1">
+              <a:schemeClr val="accent1"/>
+            </a:fillRef>
+            <a:effectRef idx="0">
+              <a:schemeClr val="accent1"/>
+            </a:effectRef>
+            <a:fontRef idx="minor">
+              <a:schemeClr val="lt1"/>
+            </a:fontRef>
+          </p:style>
+          <p:txBody>
+            <a:bodyPr rtlCol="0" anchor="ctr"/>
+            <a:lstStyle/>
+            <a:p>
+              <a:pPr algn="ctr"/>
+              <a:r>
+                <a:rPr lang="en-US" dirty="0" smtClean="0"/>
+                <a:t>1</a:t>
+              </a:r>
+              <a:endParaRPr lang="en-US" dirty="0"/>
+            </a:p>
+          </p:txBody>
+        </p:sp>
+        <p:sp>
+          <p:nvSpPr>
+            <p:cNvPr id="10" name="Oval 9"/>
+            <p:cNvSpPr/>
+            <p:nvPr/>
+          </p:nvSpPr>
+          <p:spPr>
+            <a:xfrm>
+              <a:off x="2943225" y="2190750"/>
+              <a:ext cx="304800" cy="381000"/>
+            </a:xfrm>
+            <a:prstGeom prst="ellipse">
+              <a:avLst/>
+            </a:prstGeom>
+            <a:solidFill>
+              <a:schemeClr val="accent1">
+                <a:lumMod val="40000"/>
+                <a:lumOff val="60000"/>
+              </a:schemeClr>
+            </a:solidFill>
+          </p:spPr>
+          <p:style>
+            <a:lnRef idx="2">
+              <a:schemeClr val="accent1">
+                <a:shade val="50000"/>
+              </a:schemeClr>
+            </a:lnRef>
+            <a:fillRef idx="1">
+              <a:schemeClr val="accent1"/>
+            </a:fillRef>
+            <a:effectRef idx="0">
+              <a:schemeClr val="accent1"/>
+            </a:effectRef>
+            <a:fontRef idx="minor">
+              <a:schemeClr val="lt1"/>
+            </a:fontRef>
+          </p:style>
+          <p:txBody>
+            <a:bodyPr rtlCol="0" anchor="ctr"/>
+            <a:lstStyle/>
+            <a:p>
+              <a:pPr algn="ctr"/>
+              <a:r>
+                <a:rPr lang="en-US" dirty="0" smtClean="0"/>
+                <a:t>2</a:t>
+              </a:r>
+              <a:endParaRPr lang="en-US" dirty="0"/>
+            </a:p>
+          </p:txBody>
+        </p:sp>
+        <p:sp>
+          <p:nvSpPr>
+            <p:cNvPr id="11" name="Oval 10"/>
+            <p:cNvSpPr/>
+            <p:nvPr/>
+          </p:nvSpPr>
+          <p:spPr>
+            <a:xfrm>
+              <a:off x="2147886" y="3086100"/>
+              <a:ext cx="304800" cy="381000"/>
+            </a:xfrm>
+            <a:prstGeom prst="ellipse">
+              <a:avLst/>
+            </a:prstGeom>
+            <a:solidFill>
+              <a:schemeClr val="accent1">
+                <a:lumMod val="40000"/>
+                <a:lumOff val="60000"/>
+              </a:schemeClr>
+            </a:solidFill>
+          </p:spPr>
+          <p:style>
+            <a:lnRef idx="2">
+              <a:schemeClr val="accent1">
+                <a:shade val="50000"/>
+              </a:schemeClr>
+            </a:lnRef>
+            <a:fillRef idx="1">
+              <a:schemeClr val="accent1"/>
+            </a:fillRef>
+            <a:effectRef idx="0">
+              <a:schemeClr val="accent1"/>
+            </a:effectRef>
+            <a:fontRef idx="minor">
+              <a:schemeClr val="lt1"/>
+            </a:fontRef>
+          </p:style>
+          <p:txBody>
+            <a:bodyPr rtlCol="0" anchor="ctr"/>
+            <a:lstStyle/>
+            <a:p>
+              <a:pPr algn="ctr"/>
+              <a:r>
+                <a:rPr lang="en-US" dirty="0" smtClean="0"/>
+                <a:t>3</a:t>
+              </a:r>
+              <a:endParaRPr lang="en-US" dirty="0"/>
+            </a:p>
+          </p:txBody>
+        </p:sp>
+        <p:sp>
+          <p:nvSpPr>
+            <p:cNvPr id="12" name="Oval 11"/>
+            <p:cNvSpPr/>
+            <p:nvPr/>
+          </p:nvSpPr>
+          <p:spPr>
+            <a:xfrm>
+              <a:off x="1371600" y="3886200"/>
+              <a:ext cx="304800" cy="381000"/>
+            </a:xfrm>
+            <a:prstGeom prst="ellipse">
+              <a:avLst/>
+            </a:prstGeom>
+            <a:solidFill>
+              <a:schemeClr val="accent1">
+                <a:lumMod val="40000"/>
+                <a:lumOff val="60000"/>
+              </a:schemeClr>
+            </a:solidFill>
+          </p:spPr>
+          <p:style>
+            <a:lnRef idx="2">
+              <a:schemeClr val="accent1">
+                <a:shade val="50000"/>
+              </a:schemeClr>
+            </a:lnRef>
+            <a:fillRef idx="1">
+              <a:schemeClr val="accent1"/>
+            </a:fillRef>
+            <a:effectRef idx="0">
+              <a:schemeClr val="accent1"/>
+            </a:effectRef>
+            <a:fontRef idx="minor">
+              <a:schemeClr val="lt1"/>
+            </a:fontRef>
+          </p:style>
+          <p:txBody>
+            <a:bodyPr rtlCol="0" anchor="ctr"/>
+            <a:lstStyle/>
+            <a:p>
+              <a:pPr algn="ctr"/>
+              <a:r>
+                <a:rPr lang="en-US" dirty="0" smtClean="0"/>
+                <a:t>4</a:t>
+              </a:r>
+              <a:endParaRPr lang="en-US" dirty="0"/>
+            </a:p>
+          </p:txBody>
+        </p:sp>
+        <p:sp>
+          <p:nvSpPr>
+            <p:cNvPr id="13" name="Oval 12"/>
+            <p:cNvSpPr/>
+            <p:nvPr/>
+          </p:nvSpPr>
+          <p:spPr>
+            <a:xfrm>
+              <a:off x="2176462" y="3886200"/>
+              <a:ext cx="304800" cy="381000"/>
+            </a:xfrm>
+            <a:prstGeom prst="ellipse">
+              <a:avLst/>
+            </a:prstGeom>
+            <a:solidFill>
+              <a:schemeClr val="accent1">
+                <a:lumMod val="40000"/>
+                <a:lumOff val="60000"/>
+              </a:schemeClr>
+            </a:solidFill>
+          </p:spPr>
+          <p:style>
+            <a:lnRef idx="2">
+              <a:schemeClr val="accent1">
+                <a:shade val="50000"/>
+              </a:schemeClr>
+            </a:lnRef>
+            <a:fillRef idx="1">
+              <a:schemeClr val="accent1"/>
+            </a:fillRef>
+            <a:effectRef idx="0">
+              <a:schemeClr val="accent1"/>
+            </a:effectRef>
+            <a:fontRef idx="minor">
+              <a:schemeClr val="lt1"/>
+            </a:fontRef>
+          </p:style>
+          <p:txBody>
+            <a:bodyPr rtlCol="0" anchor="ctr"/>
+            <a:lstStyle/>
+            <a:p>
+              <a:pPr algn="ctr"/>
+              <a:r>
+                <a:rPr lang="en-US" dirty="0" smtClean="0"/>
+                <a:t>5</a:t>
+              </a:r>
+              <a:endParaRPr lang="en-US" dirty="0"/>
+            </a:p>
+          </p:txBody>
+        </p:sp>
+        <p:sp>
+          <p:nvSpPr>
+            <p:cNvPr id="14" name="Oval 13"/>
+            <p:cNvSpPr/>
+            <p:nvPr/>
+          </p:nvSpPr>
+          <p:spPr>
+            <a:xfrm>
+              <a:off x="2933700" y="3095625"/>
+              <a:ext cx="304800" cy="381000"/>
+            </a:xfrm>
+            <a:prstGeom prst="ellipse">
+              <a:avLst/>
+            </a:prstGeom>
+            <a:solidFill>
+              <a:schemeClr val="accent1">
+                <a:lumMod val="40000"/>
+                <a:lumOff val="60000"/>
+              </a:schemeClr>
+            </a:solidFill>
+          </p:spPr>
+          <p:style>
+            <a:lnRef idx="2">
+              <a:schemeClr val="accent1">
+                <a:shade val="50000"/>
+              </a:schemeClr>
+            </a:lnRef>
+            <a:fillRef idx="1">
+              <a:schemeClr val="accent1"/>
+            </a:fillRef>
+            <a:effectRef idx="0">
+              <a:schemeClr val="accent1"/>
+            </a:effectRef>
+            <a:fontRef idx="minor">
+              <a:schemeClr val="lt1"/>
+            </a:fontRef>
+          </p:style>
+          <p:txBody>
+            <a:bodyPr rtlCol="0" anchor="ctr"/>
+            <a:lstStyle/>
+            <a:p>
+              <a:pPr algn="ctr"/>
+              <a:r>
+                <a:rPr lang="en-US" dirty="0" smtClean="0"/>
+                <a:t>6</a:t>
+              </a:r>
+              <a:endParaRPr lang="en-US" dirty="0"/>
+            </a:p>
+          </p:txBody>
+        </p:sp>
+        <p:sp>
+          <p:nvSpPr>
+            <p:cNvPr id="15" name="Oval 14"/>
+            <p:cNvSpPr/>
+            <p:nvPr/>
+          </p:nvSpPr>
+          <p:spPr>
+            <a:xfrm>
+              <a:off x="3733800" y="2190750"/>
+              <a:ext cx="304800" cy="381000"/>
+            </a:xfrm>
+            <a:prstGeom prst="ellipse">
+              <a:avLst/>
+            </a:prstGeom>
+            <a:solidFill>
+              <a:schemeClr val="accent1">
+                <a:lumMod val="40000"/>
+                <a:lumOff val="60000"/>
+              </a:schemeClr>
+            </a:solidFill>
+          </p:spPr>
+          <p:style>
+            <a:lnRef idx="2">
+              <a:schemeClr val="accent1">
+                <a:shade val="50000"/>
+              </a:schemeClr>
+            </a:lnRef>
+            <a:fillRef idx="1">
+              <a:schemeClr val="accent1"/>
+            </a:fillRef>
+            <a:effectRef idx="0">
+              <a:schemeClr val="accent1"/>
+            </a:effectRef>
+            <a:fontRef idx="minor">
+              <a:schemeClr val="lt1"/>
+            </a:fontRef>
+          </p:style>
+          <p:txBody>
+            <a:bodyPr rtlCol="0" anchor="ctr"/>
+            <a:lstStyle/>
+            <a:p>
+              <a:pPr algn="ctr"/>
+              <a:r>
+                <a:rPr lang="en-US" dirty="0" smtClean="0"/>
+                <a:t>7</a:t>
+              </a:r>
+              <a:endParaRPr lang="en-US" dirty="0"/>
+            </a:p>
+          </p:txBody>
+        </p:sp>
+        <p:sp>
+          <p:nvSpPr>
+            <p:cNvPr id="16" name="Oval 15"/>
+            <p:cNvSpPr/>
+            <p:nvPr/>
+          </p:nvSpPr>
+          <p:spPr>
+            <a:xfrm>
+              <a:off x="4572000" y="2190750"/>
+              <a:ext cx="304800" cy="381000"/>
+            </a:xfrm>
+            <a:prstGeom prst="ellipse">
+              <a:avLst/>
+            </a:prstGeom>
+            <a:solidFill>
+              <a:schemeClr val="accent1">
+                <a:lumMod val="40000"/>
+                <a:lumOff val="60000"/>
+              </a:schemeClr>
+            </a:solidFill>
+          </p:spPr>
+          <p:style>
+            <a:lnRef idx="2">
+              <a:schemeClr val="accent1">
+                <a:shade val="50000"/>
+              </a:schemeClr>
+            </a:lnRef>
+            <a:fillRef idx="1">
+              <a:schemeClr val="accent1"/>
+            </a:fillRef>
+            <a:effectRef idx="0">
+              <a:schemeClr val="accent1"/>
+            </a:effectRef>
+            <a:fontRef idx="minor">
+              <a:schemeClr val="lt1"/>
+            </a:fontRef>
+          </p:style>
+          <p:txBody>
+            <a:bodyPr rtlCol="0" anchor="ctr"/>
+            <a:lstStyle/>
+            <a:p>
+              <a:pPr algn="ctr"/>
+              <a:r>
+                <a:rPr lang="en-US" dirty="0" smtClean="0"/>
+                <a:t>8</a:t>
+              </a:r>
+              <a:endParaRPr lang="en-US" dirty="0"/>
+            </a:p>
+          </p:txBody>
+        </p:sp>
+        <p:sp>
+          <p:nvSpPr>
+            <p:cNvPr id="17" name="Oval 16"/>
+            <p:cNvSpPr/>
+            <p:nvPr/>
+          </p:nvSpPr>
+          <p:spPr>
+            <a:xfrm>
+              <a:off x="4582160" y="3095625"/>
+              <a:ext cx="304800" cy="381000"/>
+            </a:xfrm>
+            <a:prstGeom prst="ellipse">
+              <a:avLst/>
+            </a:prstGeom>
+            <a:solidFill>
+              <a:schemeClr val="accent1">
+                <a:lumMod val="40000"/>
+                <a:lumOff val="60000"/>
+              </a:schemeClr>
+            </a:solidFill>
+          </p:spPr>
+          <p:style>
+            <a:lnRef idx="2">
+              <a:schemeClr val="accent1">
+                <a:shade val="50000"/>
+              </a:schemeClr>
+            </a:lnRef>
+            <a:fillRef idx="1">
+              <a:schemeClr val="accent1"/>
+            </a:fillRef>
+            <a:effectRef idx="0">
+              <a:schemeClr val="accent1"/>
+            </a:effectRef>
+            <a:fontRef idx="minor">
+              <a:schemeClr val="lt1"/>
+            </a:fontRef>
+          </p:style>
+          <p:txBody>
+            <a:bodyPr rtlCol="0" anchor="ctr"/>
+            <a:lstStyle/>
+            <a:p>
+              <a:pPr algn="ctr"/>
+              <a:r>
+                <a:rPr lang="en-US" dirty="0"/>
+                <a:t>9</a:t>
+              </a:r>
+            </a:p>
+          </p:txBody>
+        </p:sp>
+        <p:sp>
+          <p:nvSpPr>
+            <p:cNvPr id="18" name="Oval 17"/>
+            <p:cNvSpPr/>
+            <p:nvPr/>
+          </p:nvSpPr>
+          <p:spPr>
+            <a:xfrm>
+              <a:off x="4582160" y="3886200"/>
+              <a:ext cx="304800" cy="381000"/>
+            </a:xfrm>
+            <a:prstGeom prst="ellipse">
+              <a:avLst/>
+            </a:prstGeom>
+            <a:solidFill>
+              <a:schemeClr val="accent1">
+                <a:lumMod val="40000"/>
+                <a:lumOff val="60000"/>
+              </a:schemeClr>
+            </a:solidFill>
+          </p:spPr>
+          <p:style>
+            <a:lnRef idx="2">
+              <a:schemeClr val="accent1">
+                <a:shade val="50000"/>
+              </a:schemeClr>
+            </a:lnRef>
+            <a:fillRef idx="1">
+              <a:schemeClr val="accent1"/>
+            </a:fillRef>
+            <a:effectRef idx="0">
+              <a:schemeClr val="accent1"/>
+            </a:effectRef>
+            <a:fontRef idx="minor">
+              <a:schemeClr val="lt1"/>
+            </a:fontRef>
+          </p:style>
+          <p:txBody>
+            <a:bodyPr wrap="none" rtlCol="0" anchor="ctr"/>
+            <a:lstStyle/>
+            <a:p>
+              <a:pPr algn="ctr"/>
+              <a:r>
+                <a:rPr lang="en-US" dirty="0" smtClean="0"/>
+                <a:t>10</a:t>
+              </a:r>
+              <a:endParaRPr lang="en-US" dirty="0"/>
+            </a:p>
+          </p:txBody>
+        </p:sp>
+        <p:sp>
+          <p:nvSpPr>
+            <p:cNvPr id="19" name="Oval 18"/>
+            <p:cNvSpPr/>
+            <p:nvPr/>
+          </p:nvSpPr>
+          <p:spPr>
+            <a:xfrm>
+              <a:off x="5334000" y="3886200"/>
+              <a:ext cx="304800" cy="381000"/>
+            </a:xfrm>
+            <a:prstGeom prst="ellipse">
+              <a:avLst/>
+            </a:prstGeom>
+            <a:solidFill>
+              <a:schemeClr val="accent1">
+                <a:lumMod val="40000"/>
+                <a:lumOff val="60000"/>
+              </a:schemeClr>
+            </a:solidFill>
+          </p:spPr>
+          <p:style>
+            <a:lnRef idx="2">
+              <a:schemeClr val="accent1">
+                <a:shade val="50000"/>
+              </a:schemeClr>
+            </a:lnRef>
+            <a:fillRef idx="1">
+              <a:schemeClr val="accent1"/>
+            </a:fillRef>
+            <a:effectRef idx="0">
+              <a:schemeClr val="accent1"/>
+            </a:effectRef>
+            <a:fontRef idx="minor">
+              <a:schemeClr val="lt1"/>
+            </a:fontRef>
+          </p:style>
+          <p:txBody>
+            <a:bodyPr wrap="none" rtlCol="0" anchor="ctr"/>
+            <a:lstStyle/>
+            <a:p>
+              <a:pPr algn="ctr"/>
+              <a:r>
+                <a:rPr lang="en-US" dirty="0" smtClean="0"/>
+                <a:t>11</a:t>
+              </a:r>
+              <a:endParaRPr lang="en-US" dirty="0"/>
+            </a:p>
+          </p:txBody>
+        </p:sp>
+        <p:sp>
+          <p:nvSpPr>
+            <p:cNvPr id="20" name="Oval 19"/>
+            <p:cNvSpPr/>
+            <p:nvPr/>
+          </p:nvSpPr>
+          <p:spPr>
+            <a:xfrm>
+              <a:off x="5334000" y="3095625"/>
+              <a:ext cx="304800" cy="381000"/>
+            </a:xfrm>
+            <a:prstGeom prst="ellipse">
+              <a:avLst/>
+            </a:prstGeom>
+            <a:solidFill>
+              <a:schemeClr val="accent1">
+                <a:lumMod val="40000"/>
+                <a:lumOff val="60000"/>
+              </a:schemeClr>
+            </a:solidFill>
+          </p:spPr>
+          <p:style>
+            <a:lnRef idx="2">
+              <a:schemeClr val="accent1">
+                <a:shade val="50000"/>
+              </a:schemeClr>
+            </a:lnRef>
+            <a:fillRef idx="1">
+              <a:schemeClr val="accent1"/>
+            </a:fillRef>
+            <a:effectRef idx="0">
+              <a:schemeClr val="accent1"/>
+            </a:effectRef>
+            <a:fontRef idx="minor">
+              <a:schemeClr val="lt1"/>
+            </a:fontRef>
+          </p:style>
+          <p:txBody>
+            <a:bodyPr wrap="none" rtlCol="0" anchor="ctr"/>
+            <a:lstStyle/>
+            <a:p>
+              <a:pPr algn="ctr"/>
+              <a:r>
+                <a:rPr lang="en-US" dirty="0" smtClean="0"/>
+                <a:t>12</a:t>
+              </a:r>
+              <a:endParaRPr lang="en-US" dirty="0"/>
+            </a:p>
+          </p:txBody>
+        </p:sp>
+        <p:cxnSp>
+          <p:nvCxnSpPr>
+            <p:cNvPr id="5" name="Straight Connector 4"/>
+            <p:cNvCxnSpPr>
+              <a:stCxn id="4" idx="3"/>
+              <a:endCxn id="10" idx="7"/>
+            </p:cNvCxnSpPr>
+            <p:nvPr/>
+          </p:nvCxnSpPr>
+          <p:spPr>
+            <a:xfrm flipH="1">
+              <a:off x="3203388" y="1649179"/>
+              <a:ext cx="575049" cy="597367"/>
+            </a:xfrm>
+            <a:prstGeom prst="line">
+              <a:avLst/>
+            </a:prstGeom>
+            <a:ln w="28575"/>
+          </p:spPr>
+          <p:style>
+            <a:lnRef idx="1">
+              <a:schemeClr val="accent1"/>
+            </a:lnRef>
+            <a:fillRef idx="0">
+              <a:schemeClr val="accent1"/>
+            </a:fillRef>
+            <a:effectRef idx="0">
+              <a:schemeClr val="accent1"/>
+            </a:effectRef>
+            <a:fontRef idx="minor">
+              <a:schemeClr val="tx1"/>
+            </a:fontRef>
+          </p:style>
+        </p:cxnSp>
+        <p:cxnSp>
+          <p:nvCxnSpPr>
+            <p:cNvPr id="21" name="Straight Connector 20"/>
+            <p:cNvCxnSpPr>
+              <a:endCxn id="11" idx="7"/>
+            </p:cNvCxnSpPr>
+            <p:nvPr/>
+          </p:nvCxnSpPr>
+          <p:spPr>
+            <a:xfrm flipH="1">
+              <a:off x="2408049" y="2498258"/>
+              <a:ext cx="599367" cy="643638"/>
+            </a:xfrm>
+            <a:prstGeom prst="line">
+              <a:avLst/>
+            </a:prstGeom>
+            <a:ln w="28575"/>
+          </p:spPr>
+          <p:style>
+            <a:lnRef idx="1">
+              <a:schemeClr val="accent1"/>
+            </a:lnRef>
+            <a:fillRef idx="0">
+              <a:schemeClr val="accent1"/>
+            </a:fillRef>
+            <a:effectRef idx="0">
+              <a:schemeClr val="accent1"/>
+            </a:effectRef>
+            <a:fontRef idx="minor">
+              <a:schemeClr val="tx1"/>
+            </a:fontRef>
+          </p:style>
+        </p:cxnSp>
+        <p:cxnSp>
+          <p:nvCxnSpPr>
+            <p:cNvPr id="22" name="Straight Connector 21"/>
+            <p:cNvCxnSpPr/>
+            <p:nvPr/>
+          </p:nvCxnSpPr>
+          <p:spPr>
+            <a:xfrm flipH="1">
+              <a:off x="1616653" y="3352800"/>
+              <a:ext cx="575049" cy="597367"/>
+            </a:xfrm>
+            <a:prstGeom prst="line">
+              <a:avLst/>
+            </a:prstGeom>
+            <a:ln w="28575"/>
+          </p:spPr>
+          <p:style>
+            <a:lnRef idx="1">
+              <a:schemeClr val="accent1"/>
+            </a:lnRef>
+            <a:fillRef idx="0">
+              <a:schemeClr val="accent1"/>
+            </a:fillRef>
+            <a:effectRef idx="0">
+              <a:schemeClr val="accent1"/>
+            </a:effectRef>
+            <a:fontRef idx="minor">
+              <a:schemeClr val="tx1"/>
+            </a:fontRef>
+          </p:style>
+        </p:cxnSp>
+        <p:cxnSp>
+          <p:nvCxnSpPr>
+            <p:cNvPr id="23" name="Straight Connector 22"/>
+            <p:cNvCxnSpPr>
+              <a:endCxn id="13" idx="0"/>
+            </p:cNvCxnSpPr>
+            <p:nvPr/>
+          </p:nvCxnSpPr>
+          <p:spPr>
+            <a:xfrm flipH="1">
+              <a:off x="2328862" y="3476625"/>
+              <a:ext cx="7621" cy="409575"/>
+            </a:xfrm>
+            <a:prstGeom prst="line">
+              <a:avLst/>
+            </a:prstGeom>
+            <a:ln w="28575"/>
+          </p:spPr>
+          <p:style>
+            <a:lnRef idx="1">
+              <a:schemeClr val="accent1"/>
+            </a:lnRef>
+            <a:fillRef idx="0">
+              <a:schemeClr val="accent1"/>
+            </a:fillRef>
+            <a:effectRef idx="0">
+              <a:schemeClr val="accent1"/>
+            </a:effectRef>
+            <a:fontRef idx="minor">
+              <a:schemeClr val="tx1"/>
+            </a:fontRef>
+          </p:style>
+        </p:cxnSp>
+        <p:cxnSp>
+          <p:nvCxnSpPr>
+            <p:cNvPr id="25" name="Straight Connector 24"/>
+            <p:cNvCxnSpPr>
+              <a:endCxn id="14" idx="0"/>
+            </p:cNvCxnSpPr>
+            <p:nvPr/>
+          </p:nvCxnSpPr>
+          <p:spPr>
+            <a:xfrm flipH="1">
+              <a:off x="3086100" y="2571750"/>
+              <a:ext cx="9526" cy="523875"/>
+            </a:xfrm>
+            <a:prstGeom prst="line">
+              <a:avLst/>
+            </a:prstGeom>
+            <a:ln w="28575"/>
+          </p:spPr>
+          <p:style>
+            <a:lnRef idx="1">
+              <a:schemeClr val="accent1"/>
+            </a:lnRef>
+            <a:fillRef idx="0">
+              <a:schemeClr val="accent1"/>
+            </a:fillRef>
+            <a:effectRef idx="0">
+              <a:schemeClr val="accent1"/>
+            </a:effectRef>
+            <a:fontRef idx="minor">
+              <a:schemeClr val="tx1"/>
+            </a:fontRef>
+          </p:style>
+        </p:cxnSp>
+        <p:cxnSp>
+          <p:nvCxnSpPr>
+            <p:cNvPr id="27" name="Straight Connector 26"/>
+            <p:cNvCxnSpPr>
+              <a:endCxn id="15" idx="0"/>
+            </p:cNvCxnSpPr>
+            <p:nvPr/>
+          </p:nvCxnSpPr>
+          <p:spPr>
+            <a:xfrm flipH="1">
+              <a:off x="3886200" y="1711325"/>
+              <a:ext cx="15241" cy="479425"/>
+            </a:xfrm>
+            <a:prstGeom prst="line">
+              <a:avLst/>
+            </a:prstGeom>
+            <a:ln w="28575"/>
+          </p:spPr>
+          <p:style>
+            <a:lnRef idx="1">
+              <a:schemeClr val="accent1"/>
+            </a:lnRef>
+            <a:fillRef idx="0">
+              <a:schemeClr val="accent1"/>
+            </a:fillRef>
+            <a:effectRef idx="0">
+              <a:schemeClr val="accent1"/>
+            </a:effectRef>
+            <a:fontRef idx="minor">
+              <a:schemeClr val="tx1"/>
+            </a:fontRef>
+          </p:style>
+        </p:cxnSp>
+        <p:cxnSp>
+          <p:nvCxnSpPr>
+            <p:cNvPr id="29" name="Straight Connector 28"/>
+            <p:cNvCxnSpPr>
+              <a:stCxn id="16" idx="1"/>
+              <a:endCxn id="4" idx="5"/>
+            </p:cNvCxnSpPr>
+            <p:nvPr/>
+          </p:nvCxnSpPr>
+          <p:spPr>
+            <a:xfrm flipH="1" flipV="1">
+              <a:off x="3993963" y="1649179"/>
+              <a:ext cx="622674" cy="597367"/>
+            </a:xfrm>
+            <a:prstGeom prst="line">
+              <a:avLst/>
+            </a:prstGeom>
+            <a:ln w="28575"/>
+          </p:spPr>
+          <p:style>
+            <a:lnRef idx="1">
+              <a:schemeClr val="accent1"/>
+            </a:lnRef>
+            <a:fillRef idx="0">
+              <a:schemeClr val="accent1"/>
+            </a:fillRef>
+            <a:effectRef idx="0">
+              <a:schemeClr val="accent1"/>
+            </a:effectRef>
+            <a:fontRef idx="minor">
+              <a:schemeClr val="tx1"/>
+            </a:fontRef>
+          </p:style>
+        </p:cxnSp>
+        <p:cxnSp>
+          <p:nvCxnSpPr>
+            <p:cNvPr id="24" name="Straight Connector 23"/>
+            <p:cNvCxnSpPr>
+              <a:endCxn id="17" idx="0"/>
+            </p:cNvCxnSpPr>
+            <p:nvPr/>
+          </p:nvCxnSpPr>
+          <p:spPr>
+            <a:xfrm>
+              <a:off x="4724401" y="2571750"/>
+              <a:ext cx="10159" cy="523875"/>
+            </a:xfrm>
+            <a:prstGeom prst="line">
+              <a:avLst/>
+            </a:prstGeom>
+            <a:ln w="28575"/>
+          </p:spPr>
+          <p:style>
+            <a:lnRef idx="1">
+              <a:schemeClr val="accent1"/>
+            </a:lnRef>
+            <a:fillRef idx="0">
+              <a:schemeClr val="accent1"/>
+            </a:fillRef>
+            <a:effectRef idx="0">
+              <a:schemeClr val="accent1"/>
+            </a:effectRef>
+            <a:fontRef idx="minor">
+              <a:schemeClr val="tx1"/>
+            </a:fontRef>
+          </p:style>
+        </p:cxnSp>
+        <p:cxnSp>
+          <p:nvCxnSpPr>
+            <p:cNvPr id="26" name="Straight Connector 25"/>
+            <p:cNvCxnSpPr>
+              <a:stCxn id="16" idx="5"/>
+              <a:endCxn id="20" idx="1"/>
+            </p:cNvCxnSpPr>
+            <p:nvPr/>
+          </p:nvCxnSpPr>
+          <p:spPr>
+            <a:xfrm>
+              <a:off x="4832163" y="2515954"/>
+              <a:ext cx="546474" cy="635467"/>
+            </a:xfrm>
+            <a:prstGeom prst="line">
+              <a:avLst/>
+            </a:prstGeom>
+            <a:ln w="28575"/>
+          </p:spPr>
+          <p:style>
+            <a:lnRef idx="1">
+              <a:schemeClr val="accent1"/>
+            </a:lnRef>
+            <a:fillRef idx="0">
+              <a:schemeClr val="accent1"/>
+            </a:fillRef>
+            <a:effectRef idx="0">
+              <a:schemeClr val="accent1"/>
+            </a:effectRef>
+            <a:fontRef idx="minor">
+              <a:schemeClr val="tx1"/>
+            </a:fontRef>
+          </p:style>
+        </p:cxnSp>
+        <p:cxnSp>
+          <p:nvCxnSpPr>
+            <p:cNvPr id="28" name="Straight Connector 27"/>
+            <p:cNvCxnSpPr/>
+            <p:nvPr/>
+          </p:nvCxnSpPr>
+          <p:spPr>
+            <a:xfrm flipH="1">
+              <a:off x="4729480" y="3441699"/>
+              <a:ext cx="15241" cy="479425"/>
+            </a:xfrm>
+            <a:prstGeom prst="line">
+              <a:avLst/>
+            </a:prstGeom>
+            <a:ln w="28575"/>
+          </p:spPr>
+          <p:style>
+            <a:lnRef idx="1">
+              <a:schemeClr val="accent1"/>
+            </a:lnRef>
+            <a:fillRef idx="0">
+              <a:schemeClr val="accent1"/>
+            </a:fillRef>
+            <a:effectRef idx="0">
+              <a:schemeClr val="accent1"/>
+            </a:effectRef>
+            <a:fontRef idx="minor">
+              <a:schemeClr val="tx1"/>
+            </a:fontRef>
+          </p:style>
+        </p:cxnSp>
+        <p:cxnSp>
+          <p:nvCxnSpPr>
+            <p:cNvPr id="30" name="Straight Connector 29"/>
+            <p:cNvCxnSpPr>
+              <a:stCxn id="17" idx="5"/>
+              <a:endCxn id="19" idx="1"/>
+            </p:cNvCxnSpPr>
+            <p:nvPr/>
+          </p:nvCxnSpPr>
+          <p:spPr>
+            <a:xfrm>
+              <a:off x="4842323" y="3420829"/>
+              <a:ext cx="536314" cy="521167"/>
+            </a:xfrm>
+            <a:prstGeom prst="line">
+              <a:avLst/>
+            </a:prstGeom>
+            <a:ln w="28575"/>
+          </p:spPr>
+          <p:style>
+            <a:lnRef idx="1">
+              <a:schemeClr val="accent1"/>
+            </a:lnRef>
+            <a:fillRef idx="0">
+              <a:schemeClr val="accent1"/>
+            </a:fillRef>
+            <a:effectRef idx="0">
+              <a:schemeClr val="accent1"/>
+            </a:effectRef>
+            <a:fontRef idx="minor">
+              <a:schemeClr val="tx1"/>
+            </a:fontRef>
+          </p:style>
+        </p:cxnSp>
+      </p:grpSp>
     </p:spTree>
     <p:extLst>
       <p:ext uri="{BB962C8B-B14F-4D97-AF65-F5344CB8AC3E}">
@@ -4107,6 +4255,1136 @@
           <a:lstStyle/>
           <a:p>
             <a:r>
+              <a:rPr lang="en-US" sz="2800" dirty="0"/>
+              <a:t>Depth-first and breadth-first search</a:t>
+            </a:r>
+          </a:p>
+        </p:txBody>
+      </p:sp>
+      <p:grpSp>
+        <p:nvGrpSpPr>
+          <p:cNvPr id="28" name="Group 27"/>
+          <p:cNvGrpSpPr/>
+          <p:nvPr/>
+        </p:nvGrpSpPr>
+        <p:grpSpPr>
+          <a:xfrm>
+            <a:off x="1911797" y="2005012"/>
+            <a:ext cx="4267200" cy="2943225"/>
+            <a:chOff x="1911797" y="2005012"/>
+            <a:chExt cx="4267200" cy="2943225"/>
+          </a:xfrm>
+        </p:grpSpPr>
+        <p:sp>
+          <p:nvSpPr>
+            <p:cNvPr id="5" name="Oval 4"/>
+            <p:cNvSpPr/>
+            <p:nvPr/>
+          </p:nvSpPr>
+          <p:spPr>
+            <a:xfrm>
+              <a:off x="4273997" y="2005012"/>
+              <a:ext cx="304800" cy="381000"/>
+            </a:xfrm>
+            <a:prstGeom prst="ellipse">
+              <a:avLst/>
+            </a:prstGeom>
+            <a:solidFill>
+              <a:schemeClr val="accent1">
+                <a:lumMod val="40000"/>
+                <a:lumOff val="60000"/>
+              </a:schemeClr>
+            </a:solidFill>
+          </p:spPr>
+          <p:style>
+            <a:lnRef idx="2">
+              <a:schemeClr val="accent1">
+                <a:shade val="50000"/>
+              </a:schemeClr>
+            </a:lnRef>
+            <a:fillRef idx="1">
+              <a:schemeClr val="accent1"/>
+            </a:fillRef>
+            <a:effectRef idx="0">
+              <a:schemeClr val="accent1"/>
+            </a:effectRef>
+            <a:fontRef idx="minor">
+              <a:schemeClr val="lt1"/>
+            </a:fontRef>
+          </p:style>
+          <p:txBody>
+            <a:bodyPr rtlCol="0" anchor="ctr"/>
+            <a:lstStyle/>
+            <a:p>
+              <a:pPr algn="ctr"/>
+              <a:r>
+                <a:rPr lang="en-US" dirty="0" smtClean="0"/>
+                <a:t>1</a:t>
+              </a:r>
+              <a:endParaRPr lang="en-US" dirty="0"/>
+            </a:p>
+          </p:txBody>
+        </p:sp>
+        <p:sp>
+          <p:nvSpPr>
+            <p:cNvPr id="6" name="Oval 5"/>
+            <p:cNvSpPr/>
+            <p:nvPr/>
+          </p:nvSpPr>
+          <p:spPr>
+            <a:xfrm>
+              <a:off x="3483422" y="2871787"/>
+              <a:ext cx="304800" cy="381000"/>
+            </a:xfrm>
+            <a:prstGeom prst="ellipse">
+              <a:avLst/>
+            </a:prstGeom>
+            <a:solidFill>
+              <a:schemeClr val="accent1">
+                <a:lumMod val="40000"/>
+                <a:lumOff val="60000"/>
+              </a:schemeClr>
+            </a:solidFill>
+          </p:spPr>
+          <p:style>
+            <a:lnRef idx="2">
+              <a:schemeClr val="accent1">
+                <a:shade val="50000"/>
+              </a:schemeClr>
+            </a:lnRef>
+            <a:fillRef idx="1">
+              <a:schemeClr val="accent1"/>
+            </a:fillRef>
+            <a:effectRef idx="0">
+              <a:schemeClr val="accent1"/>
+            </a:effectRef>
+            <a:fontRef idx="minor">
+              <a:schemeClr val="lt1"/>
+            </a:fontRef>
+          </p:style>
+          <p:txBody>
+            <a:bodyPr rtlCol="0" anchor="ctr"/>
+            <a:lstStyle/>
+            <a:p>
+              <a:pPr algn="ctr"/>
+              <a:r>
+                <a:rPr lang="en-US" dirty="0" smtClean="0"/>
+                <a:t>2</a:t>
+              </a:r>
+              <a:endParaRPr lang="en-US" dirty="0"/>
+            </a:p>
+          </p:txBody>
+        </p:sp>
+        <p:sp>
+          <p:nvSpPr>
+            <p:cNvPr id="7" name="Oval 6"/>
+            <p:cNvSpPr/>
+            <p:nvPr/>
+          </p:nvSpPr>
+          <p:spPr>
+            <a:xfrm>
+              <a:off x="2688083" y="3767137"/>
+              <a:ext cx="304800" cy="381000"/>
+            </a:xfrm>
+            <a:prstGeom prst="ellipse">
+              <a:avLst/>
+            </a:prstGeom>
+            <a:solidFill>
+              <a:schemeClr val="accent1">
+                <a:lumMod val="40000"/>
+                <a:lumOff val="60000"/>
+              </a:schemeClr>
+            </a:solidFill>
+          </p:spPr>
+          <p:style>
+            <a:lnRef idx="2">
+              <a:schemeClr val="accent1">
+                <a:shade val="50000"/>
+              </a:schemeClr>
+            </a:lnRef>
+            <a:fillRef idx="1">
+              <a:schemeClr val="accent1"/>
+            </a:fillRef>
+            <a:effectRef idx="0">
+              <a:schemeClr val="accent1"/>
+            </a:effectRef>
+            <a:fontRef idx="minor">
+              <a:schemeClr val="lt1"/>
+            </a:fontRef>
+          </p:style>
+          <p:txBody>
+            <a:bodyPr rtlCol="0" anchor="ctr"/>
+            <a:lstStyle/>
+            <a:p>
+              <a:pPr algn="ctr"/>
+              <a:r>
+                <a:rPr lang="en-US" dirty="0"/>
+                <a:t>5</a:t>
+              </a:r>
+              <a:endParaRPr lang="en-US" dirty="0"/>
+            </a:p>
+          </p:txBody>
+        </p:sp>
+        <p:sp>
+          <p:nvSpPr>
+            <p:cNvPr id="8" name="Oval 7"/>
+            <p:cNvSpPr/>
+            <p:nvPr/>
+          </p:nvSpPr>
+          <p:spPr>
+            <a:xfrm>
+              <a:off x="1911797" y="4567237"/>
+              <a:ext cx="304800" cy="381000"/>
+            </a:xfrm>
+            <a:prstGeom prst="ellipse">
+              <a:avLst/>
+            </a:prstGeom>
+            <a:solidFill>
+              <a:schemeClr val="accent1">
+                <a:lumMod val="40000"/>
+                <a:lumOff val="60000"/>
+              </a:schemeClr>
+            </a:solidFill>
+          </p:spPr>
+          <p:style>
+            <a:lnRef idx="2">
+              <a:schemeClr val="accent1">
+                <a:shade val="50000"/>
+              </a:schemeClr>
+            </a:lnRef>
+            <a:fillRef idx="1">
+              <a:schemeClr val="accent1"/>
+            </a:fillRef>
+            <a:effectRef idx="0">
+              <a:schemeClr val="accent1"/>
+            </a:effectRef>
+            <a:fontRef idx="minor">
+              <a:schemeClr val="lt1"/>
+            </a:fontRef>
+          </p:style>
+          <p:txBody>
+            <a:bodyPr rtlCol="0" anchor="ctr"/>
+            <a:lstStyle/>
+            <a:p>
+              <a:pPr algn="ctr"/>
+              <a:r>
+                <a:rPr lang="en-US" dirty="0"/>
+                <a:t>9</a:t>
+              </a:r>
+              <a:endParaRPr lang="en-US" dirty="0"/>
+            </a:p>
+          </p:txBody>
+        </p:sp>
+        <p:sp>
+          <p:nvSpPr>
+            <p:cNvPr id="9" name="Oval 8"/>
+            <p:cNvSpPr/>
+            <p:nvPr/>
+          </p:nvSpPr>
+          <p:spPr>
+            <a:xfrm>
+              <a:off x="2716659" y="4567237"/>
+              <a:ext cx="304800" cy="381000"/>
+            </a:xfrm>
+            <a:prstGeom prst="ellipse">
+              <a:avLst/>
+            </a:prstGeom>
+            <a:solidFill>
+              <a:schemeClr val="accent1">
+                <a:lumMod val="40000"/>
+                <a:lumOff val="60000"/>
+              </a:schemeClr>
+            </a:solidFill>
+          </p:spPr>
+          <p:style>
+            <a:lnRef idx="2">
+              <a:schemeClr val="accent1">
+                <a:shade val="50000"/>
+              </a:schemeClr>
+            </a:lnRef>
+            <a:fillRef idx="1">
+              <a:schemeClr val="accent1"/>
+            </a:fillRef>
+            <a:effectRef idx="0">
+              <a:schemeClr val="accent1"/>
+            </a:effectRef>
+            <a:fontRef idx="minor">
+              <a:schemeClr val="lt1"/>
+            </a:fontRef>
+          </p:style>
+          <p:txBody>
+            <a:bodyPr wrap="none" rtlCol="0" anchor="ctr"/>
+            <a:lstStyle/>
+            <a:p>
+              <a:pPr algn="ctr"/>
+              <a:r>
+                <a:rPr lang="en-US" dirty="0" smtClean="0"/>
+                <a:t>10</a:t>
+              </a:r>
+              <a:endParaRPr lang="en-US" dirty="0"/>
+            </a:p>
+          </p:txBody>
+        </p:sp>
+        <p:sp>
+          <p:nvSpPr>
+            <p:cNvPr id="10" name="Oval 9"/>
+            <p:cNvSpPr/>
+            <p:nvPr/>
+          </p:nvSpPr>
+          <p:spPr>
+            <a:xfrm>
+              <a:off x="3473897" y="3776662"/>
+              <a:ext cx="304800" cy="381000"/>
+            </a:xfrm>
+            <a:prstGeom prst="ellipse">
+              <a:avLst/>
+            </a:prstGeom>
+            <a:solidFill>
+              <a:schemeClr val="accent1">
+                <a:lumMod val="40000"/>
+                <a:lumOff val="60000"/>
+              </a:schemeClr>
+            </a:solidFill>
+          </p:spPr>
+          <p:style>
+            <a:lnRef idx="2">
+              <a:schemeClr val="accent1">
+                <a:shade val="50000"/>
+              </a:schemeClr>
+            </a:lnRef>
+            <a:fillRef idx="1">
+              <a:schemeClr val="accent1"/>
+            </a:fillRef>
+            <a:effectRef idx="0">
+              <a:schemeClr val="accent1"/>
+            </a:effectRef>
+            <a:fontRef idx="minor">
+              <a:schemeClr val="lt1"/>
+            </a:fontRef>
+          </p:style>
+          <p:txBody>
+            <a:bodyPr rtlCol="0" anchor="ctr"/>
+            <a:lstStyle/>
+            <a:p>
+              <a:pPr algn="ctr"/>
+              <a:r>
+                <a:rPr lang="en-US" dirty="0" smtClean="0"/>
+                <a:t>6</a:t>
+              </a:r>
+              <a:endParaRPr lang="en-US" dirty="0"/>
+            </a:p>
+          </p:txBody>
+        </p:sp>
+        <p:sp>
+          <p:nvSpPr>
+            <p:cNvPr id="11" name="Oval 10"/>
+            <p:cNvSpPr/>
+            <p:nvPr/>
+          </p:nvSpPr>
+          <p:spPr>
+            <a:xfrm>
+              <a:off x="4273997" y="2871787"/>
+              <a:ext cx="304800" cy="381000"/>
+            </a:xfrm>
+            <a:prstGeom prst="ellipse">
+              <a:avLst/>
+            </a:prstGeom>
+            <a:solidFill>
+              <a:schemeClr val="accent1">
+                <a:lumMod val="40000"/>
+                <a:lumOff val="60000"/>
+              </a:schemeClr>
+            </a:solidFill>
+          </p:spPr>
+          <p:style>
+            <a:lnRef idx="2">
+              <a:schemeClr val="accent1">
+                <a:shade val="50000"/>
+              </a:schemeClr>
+            </a:lnRef>
+            <a:fillRef idx="1">
+              <a:schemeClr val="accent1"/>
+            </a:fillRef>
+            <a:effectRef idx="0">
+              <a:schemeClr val="accent1"/>
+            </a:effectRef>
+            <a:fontRef idx="minor">
+              <a:schemeClr val="lt1"/>
+            </a:fontRef>
+          </p:style>
+          <p:txBody>
+            <a:bodyPr rtlCol="0" anchor="ctr"/>
+            <a:lstStyle/>
+            <a:p>
+              <a:pPr algn="ctr"/>
+              <a:r>
+                <a:rPr lang="en-US" dirty="0"/>
+                <a:t>3</a:t>
+              </a:r>
+              <a:endParaRPr lang="en-US" dirty="0"/>
+            </a:p>
+          </p:txBody>
+        </p:sp>
+        <p:sp>
+          <p:nvSpPr>
+            <p:cNvPr id="12" name="Oval 11"/>
+            <p:cNvSpPr/>
+            <p:nvPr/>
+          </p:nvSpPr>
+          <p:spPr>
+            <a:xfrm>
+              <a:off x="5112197" y="2871787"/>
+              <a:ext cx="304800" cy="381000"/>
+            </a:xfrm>
+            <a:prstGeom prst="ellipse">
+              <a:avLst/>
+            </a:prstGeom>
+            <a:solidFill>
+              <a:schemeClr val="accent1">
+                <a:lumMod val="40000"/>
+                <a:lumOff val="60000"/>
+              </a:schemeClr>
+            </a:solidFill>
+          </p:spPr>
+          <p:style>
+            <a:lnRef idx="2">
+              <a:schemeClr val="accent1">
+                <a:shade val="50000"/>
+              </a:schemeClr>
+            </a:lnRef>
+            <a:fillRef idx="1">
+              <a:schemeClr val="accent1"/>
+            </a:fillRef>
+            <a:effectRef idx="0">
+              <a:schemeClr val="accent1"/>
+            </a:effectRef>
+            <a:fontRef idx="minor">
+              <a:schemeClr val="lt1"/>
+            </a:fontRef>
+          </p:style>
+          <p:txBody>
+            <a:bodyPr rtlCol="0" anchor="ctr"/>
+            <a:lstStyle/>
+            <a:p>
+              <a:pPr algn="ctr"/>
+              <a:r>
+                <a:rPr lang="en-US" dirty="0"/>
+                <a:t>4</a:t>
+              </a:r>
+              <a:endParaRPr lang="en-US" dirty="0"/>
+            </a:p>
+          </p:txBody>
+        </p:sp>
+        <p:sp>
+          <p:nvSpPr>
+            <p:cNvPr id="13" name="Oval 12"/>
+            <p:cNvSpPr/>
+            <p:nvPr/>
+          </p:nvSpPr>
+          <p:spPr>
+            <a:xfrm>
+              <a:off x="5122357" y="3776662"/>
+              <a:ext cx="304800" cy="381000"/>
+            </a:xfrm>
+            <a:prstGeom prst="ellipse">
+              <a:avLst/>
+            </a:prstGeom>
+            <a:solidFill>
+              <a:schemeClr val="accent1">
+                <a:lumMod val="40000"/>
+                <a:lumOff val="60000"/>
+              </a:schemeClr>
+            </a:solidFill>
+          </p:spPr>
+          <p:style>
+            <a:lnRef idx="2">
+              <a:schemeClr val="accent1">
+                <a:shade val="50000"/>
+              </a:schemeClr>
+            </a:lnRef>
+            <a:fillRef idx="1">
+              <a:schemeClr val="accent1"/>
+            </a:fillRef>
+            <a:effectRef idx="0">
+              <a:schemeClr val="accent1"/>
+            </a:effectRef>
+            <a:fontRef idx="minor">
+              <a:schemeClr val="lt1"/>
+            </a:fontRef>
+          </p:style>
+          <p:txBody>
+            <a:bodyPr rtlCol="0" anchor="ctr"/>
+            <a:lstStyle/>
+            <a:p>
+              <a:pPr algn="ctr"/>
+              <a:r>
+                <a:rPr lang="en-US" dirty="0"/>
+                <a:t>7</a:t>
+              </a:r>
+              <a:endParaRPr lang="en-US" dirty="0"/>
+            </a:p>
+          </p:txBody>
+        </p:sp>
+        <p:sp>
+          <p:nvSpPr>
+            <p:cNvPr id="14" name="Oval 13"/>
+            <p:cNvSpPr/>
+            <p:nvPr/>
+          </p:nvSpPr>
+          <p:spPr>
+            <a:xfrm>
+              <a:off x="5122357" y="4567237"/>
+              <a:ext cx="304800" cy="381000"/>
+            </a:xfrm>
+            <a:prstGeom prst="ellipse">
+              <a:avLst/>
+            </a:prstGeom>
+            <a:solidFill>
+              <a:schemeClr val="accent1">
+                <a:lumMod val="40000"/>
+                <a:lumOff val="60000"/>
+              </a:schemeClr>
+            </a:solidFill>
+          </p:spPr>
+          <p:style>
+            <a:lnRef idx="2">
+              <a:schemeClr val="accent1">
+                <a:shade val="50000"/>
+              </a:schemeClr>
+            </a:lnRef>
+            <a:fillRef idx="1">
+              <a:schemeClr val="accent1"/>
+            </a:fillRef>
+            <a:effectRef idx="0">
+              <a:schemeClr val="accent1"/>
+            </a:effectRef>
+            <a:fontRef idx="minor">
+              <a:schemeClr val="lt1"/>
+            </a:fontRef>
+          </p:style>
+          <p:txBody>
+            <a:bodyPr wrap="none" rtlCol="0" anchor="ctr"/>
+            <a:lstStyle/>
+            <a:p>
+              <a:pPr algn="ctr"/>
+              <a:r>
+                <a:rPr lang="en-US" dirty="0" smtClean="0"/>
+                <a:t>11</a:t>
+              </a:r>
+              <a:endParaRPr lang="en-US" dirty="0"/>
+            </a:p>
+          </p:txBody>
+        </p:sp>
+        <p:sp>
+          <p:nvSpPr>
+            <p:cNvPr id="15" name="Oval 14"/>
+            <p:cNvSpPr/>
+            <p:nvPr/>
+          </p:nvSpPr>
+          <p:spPr>
+            <a:xfrm>
+              <a:off x="5874197" y="4567237"/>
+              <a:ext cx="304800" cy="381000"/>
+            </a:xfrm>
+            <a:prstGeom prst="ellipse">
+              <a:avLst/>
+            </a:prstGeom>
+            <a:solidFill>
+              <a:schemeClr val="accent1">
+                <a:lumMod val="40000"/>
+                <a:lumOff val="60000"/>
+              </a:schemeClr>
+            </a:solidFill>
+          </p:spPr>
+          <p:style>
+            <a:lnRef idx="2">
+              <a:schemeClr val="accent1">
+                <a:shade val="50000"/>
+              </a:schemeClr>
+            </a:lnRef>
+            <a:fillRef idx="1">
+              <a:schemeClr val="accent1"/>
+            </a:fillRef>
+            <a:effectRef idx="0">
+              <a:schemeClr val="accent1"/>
+            </a:effectRef>
+            <a:fontRef idx="minor">
+              <a:schemeClr val="lt1"/>
+            </a:fontRef>
+          </p:style>
+          <p:txBody>
+            <a:bodyPr wrap="none" rtlCol="0" anchor="ctr"/>
+            <a:lstStyle/>
+            <a:p>
+              <a:pPr algn="ctr"/>
+              <a:r>
+                <a:rPr lang="en-US" dirty="0" smtClean="0"/>
+                <a:t>12</a:t>
+              </a:r>
+              <a:endParaRPr lang="en-US" dirty="0"/>
+            </a:p>
+          </p:txBody>
+        </p:sp>
+        <p:sp>
+          <p:nvSpPr>
+            <p:cNvPr id="16" name="Oval 15"/>
+            <p:cNvSpPr/>
+            <p:nvPr/>
+          </p:nvSpPr>
+          <p:spPr>
+            <a:xfrm>
+              <a:off x="5874197" y="3776662"/>
+              <a:ext cx="304800" cy="381000"/>
+            </a:xfrm>
+            <a:prstGeom prst="ellipse">
+              <a:avLst/>
+            </a:prstGeom>
+            <a:solidFill>
+              <a:schemeClr val="accent1">
+                <a:lumMod val="40000"/>
+                <a:lumOff val="60000"/>
+              </a:schemeClr>
+            </a:solidFill>
+          </p:spPr>
+          <p:style>
+            <a:lnRef idx="2">
+              <a:schemeClr val="accent1">
+                <a:shade val="50000"/>
+              </a:schemeClr>
+            </a:lnRef>
+            <a:fillRef idx="1">
+              <a:schemeClr val="accent1"/>
+            </a:fillRef>
+            <a:effectRef idx="0">
+              <a:schemeClr val="accent1"/>
+            </a:effectRef>
+            <a:fontRef idx="minor">
+              <a:schemeClr val="lt1"/>
+            </a:fontRef>
+          </p:style>
+          <p:txBody>
+            <a:bodyPr wrap="none" rtlCol="0" anchor="ctr"/>
+            <a:lstStyle/>
+            <a:p>
+              <a:pPr algn="ctr"/>
+              <a:r>
+                <a:rPr lang="en-US" dirty="0"/>
+                <a:t>8</a:t>
+              </a:r>
+              <a:endParaRPr lang="en-US" dirty="0"/>
+            </a:p>
+          </p:txBody>
+        </p:sp>
+        <p:cxnSp>
+          <p:nvCxnSpPr>
+            <p:cNvPr id="17" name="Straight Connector 16"/>
+            <p:cNvCxnSpPr>
+              <a:stCxn id="5" idx="3"/>
+              <a:endCxn id="6" idx="7"/>
+            </p:cNvCxnSpPr>
+            <p:nvPr/>
+          </p:nvCxnSpPr>
+          <p:spPr>
+            <a:xfrm flipH="1">
+              <a:off x="3743585" y="2330216"/>
+              <a:ext cx="575049" cy="597367"/>
+            </a:xfrm>
+            <a:prstGeom prst="line">
+              <a:avLst/>
+            </a:prstGeom>
+            <a:ln w="28575"/>
+          </p:spPr>
+          <p:style>
+            <a:lnRef idx="1">
+              <a:schemeClr val="accent1"/>
+            </a:lnRef>
+            <a:fillRef idx="0">
+              <a:schemeClr val="accent1"/>
+            </a:fillRef>
+            <a:effectRef idx="0">
+              <a:schemeClr val="accent1"/>
+            </a:effectRef>
+            <a:fontRef idx="minor">
+              <a:schemeClr val="tx1"/>
+            </a:fontRef>
+          </p:style>
+        </p:cxnSp>
+        <p:cxnSp>
+          <p:nvCxnSpPr>
+            <p:cNvPr id="18" name="Straight Connector 17"/>
+            <p:cNvCxnSpPr>
+              <a:endCxn id="7" idx="7"/>
+            </p:cNvCxnSpPr>
+            <p:nvPr/>
+          </p:nvCxnSpPr>
+          <p:spPr>
+            <a:xfrm flipH="1">
+              <a:off x="2948246" y="3179295"/>
+              <a:ext cx="599367" cy="643638"/>
+            </a:xfrm>
+            <a:prstGeom prst="line">
+              <a:avLst/>
+            </a:prstGeom>
+            <a:ln w="28575"/>
+          </p:spPr>
+          <p:style>
+            <a:lnRef idx="1">
+              <a:schemeClr val="accent1"/>
+            </a:lnRef>
+            <a:fillRef idx="0">
+              <a:schemeClr val="accent1"/>
+            </a:fillRef>
+            <a:effectRef idx="0">
+              <a:schemeClr val="accent1"/>
+            </a:effectRef>
+            <a:fontRef idx="minor">
+              <a:schemeClr val="tx1"/>
+            </a:fontRef>
+          </p:style>
+        </p:cxnSp>
+        <p:cxnSp>
+          <p:nvCxnSpPr>
+            <p:cNvPr id="19" name="Straight Connector 18"/>
+            <p:cNvCxnSpPr/>
+            <p:nvPr/>
+          </p:nvCxnSpPr>
+          <p:spPr>
+            <a:xfrm flipH="1">
+              <a:off x="2156850" y="4033837"/>
+              <a:ext cx="575049" cy="597367"/>
+            </a:xfrm>
+            <a:prstGeom prst="line">
+              <a:avLst/>
+            </a:prstGeom>
+            <a:ln w="28575"/>
+          </p:spPr>
+          <p:style>
+            <a:lnRef idx="1">
+              <a:schemeClr val="accent1"/>
+            </a:lnRef>
+            <a:fillRef idx="0">
+              <a:schemeClr val="accent1"/>
+            </a:fillRef>
+            <a:effectRef idx="0">
+              <a:schemeClr val="accent1"/>
+            </a:effectRef>
+            <a:fontRef idx="minor">
+              <a:schemeClr val="tx1"/>
+            </a:fontRef>
+          </p:style>
+        </p:cxnSp>
+        <p:cxnSp>
+          <p:nvCxnSpPr>
+            <p:cNvPr id="20" name="Straight Connector 19"/>
+            <p:cNvCxnSpPr>
+              <a:endCxn id="9" idx="0"/>
+            </p:cNvCxnSpPr>
+            <p:nvPr/>
+          </p:nvCxnSpPr>
+          <p:spPr>
+            <a:xfrm flipH="1">
+              <a:off x="2869059" y="4157662"/>
+              <a:ext cx="7621" cy="409575"/>
+            </a:xfrm>
+            <a:prstGeom prst="line">
+              <a:avLst/>
+            </a:prstGeom>
+            <a:ln w="28575"/>
+          </p:spPr>
+          <p:style>
+            <a:lnRef idx="1">
+              <a:schemeClr val="accent1"/>
+            </a:lnRef>
+            <a:fillRef idx="0">
+              <a:schemeClr val="accent1"/>
+            </a:fillRef>
+            <a:effectRef idx="0">
+              <a:schemeClr val="accent1"/>
+            </a:effectRef>
+            <a:fontRef idx="minor">
+              <a:schemeClr val="tx1"/>
+            </a:fontRef>
+          </p:style>
+        </p:cxnSp>
+        <p:cxnSp>
+          <p:nvCxnSpPr>
+            <p:cNvPr id="21" name="Straight Connector 20"/>
+            <p:cNvCxnSpPr>
+              <a:endCxn id="10" idx="0"/>
+            </p:cNvCxnSpPr>
+            <p:nvPr/>
+          </p:nvCxnSpPr>
+          <p:spPr>
+            <a:xfrm flipH="1">
+              <a:off x="3626297" y="3252787"/>
+              <a:ext cx="9526" cy="523875"/>
+            </a:xfrm>
+            <a:prstGeom prst="line">
+              <a:avLst/>
+            </a:prstGeom>
+            <a:ln w="28575"/>
+          </p:spPr>
+          <p:style>
+            <a:lnRef idx="1">
+              <a:schemeClr val="accent1"/>
+            </a:lnRef>
+            <a:fillRef idx="0">
+              <a:schemeClr val="accent1"/>
+            </a:fillRef>
+            <a:effectRef idx="0">
+              <a:schemeClr val="accent1"/>
+            </a:effectRef>
+            <a:fontRef idx="minor">
+              <a:schemeClr val="tx1"/>
+            </a:fontRef>
+          </p:style>
+        </p:cxnSp>
+        <p:cxnSp>
+          <p:nvCxnSpPr>
+            <p:cNvPr id="22" name="Straight Connector 21"/>
+            <p:cNvCxnSpPr>
+              <a:endCxn id="11" idx="0"/>
+            </p:cNvCxnSpPr>
+            <p:nvPr/>
+          </p:nvCxnSpPr>
+          <p:spPr>
+            <a:xfrm flipH="1">
+              <a:off x="4426397" y="2392362"/>
+              <a:ext cx="15241" cy="479425"/>
+            </a:xfrm>
+            <a:prstGeom prst="line">
+              <a:avLst/>
+            </a:prstGeom>
+            <a:ln w="28575"/>
+          </p:spPr>
+          <p:style>
+            <a:lnRef idx="1">
+              <a:schemeClr val="accent1"/>
+            </a:lnRef>
+            <a:fillRef idx="0">
+              <a:schemeClr val="accent1"/>
+            </a:fillRef>
+            <a:effectRef idx="0">
+              <a:schemeClr val="accent1"/>
+            </a:effectRef>
+            <a:fontRef idx="minor">
+              <a:schemeClr val="tx1"/>
+            </a:fontRef>
+          </p:style>
+        </p:cxnSp>
+        <p:cxnSp>
+          <p:nvCxnSpPr>
+            <p:cNvPr id="23" name="Straight Connector 22"/>
+            <p:cNvCxnSpPr>
+              <a:stCxn id="12" idx="1"/>
+              <a:endCxn id="5" idx="5"/>
+            </p:cNvCxnSpPr>
+            <p:nvPr/>
+          </p:nvCxnSpPr>
+          <p:spPr>
+            <a:xfrm flipH="1" flipV="1">
+              <a:off x="4534160" y="2330216"/>
+              <a:ext cx="622674" cy="597367"/>
+            </a:xfrm>
+            <a:prstGeom prst="line">
+              <a:avLst/>
+            </a:prstGeom>
+            <a:ln w="28575"/>
+          </p:spPr>
+          <p:style>
+            <a:lnRef idx="1">
+              <a:schemeClr val="accent1"/>
+            </a:lnRef>
+            <a:fillRef idx="0">
+              <a:schemeClr val="accent1"/>
+            </a:fillRef>
+            <a:effectRef idx="0">
+              <a:schemeClr val="accent1"/>
+            </a:effectRef>
+            <a:fontRef idx="minor">
+              <a:schemeClr val="tx1"/>
+            </a:fontRef>
+          </p:style>
+        </p:cxnSp>
+        <p:cxnSp>
+          <p:nvCxnSpPr>
+            <p:cNvPr id="24" name="Straight Connector 23"/>
+            <p:cNvCxnSpPr>
+              <a:endCxn id="13" idx="0"/>
+            </p:cNvCxnSpPr>
+            <p:nvPr/>
+          </p:nvCxnSpPr>
+          <p:spPr>
+            <a:xfrm>
+              <a:off x="5264598" y="3252787"/>
+              <a:ext cx="10159" cy="523875"/>
+            </a:xfrm>
+            <a:prstGeom prst="line">
+              <a:avLst/>
+            </a:prstGeom>
+            <a:ln w="28575"/>
+          </p:spPr>
+          <p:style>
+            <a:lnRef idx="1">
+              <a:schemeClr val="accent1"/>
+            </a:lnRef>
+            <a:fillRef idx="0">
+              <a:schemeClr val="accent1"/>
+            </a:fillRef>
+            <a:effectRef idx="0">
+              <a:schemeClr val="accent1"/>
+            </a:effectRef>
+            <a:fontRef idx="minor">
+              <a:schemeClr val="tx1"/>
+            </a:fontRef>
+          </p:style>
+        </p:cxnSp>
+        <p:cxnSp>
+          <p:nvCxnSpPr>
+            <p:cNvPr id="25" name="Straight Connector 24"/>
+            <p:cNvCxnSpPr>
+              <a:stCxn id="12" idx="5"/>
+              <a:endCxn id="16" idx="1"/>
+            </p:cNvCxnSpPr>
+            <p:nvPr/>
+          </p:nvCxnSpPr>
+          <p:spPr>
+            <a:xfrm>
+              <a:off x="5372360" y="3196991"/>
+              <a:ext cx="546474" cy="635467"/>
+            </a:xfrm>
+            <a:prstGeom prst="line">
+              <a:avLst/>
+            </a:prstGeom>
+            <a:ln w="28575"/>
+          </p:spPr>
+          <p:style>
+            <a:lnRef idx="1">
+              <a:schemeClr val="accent1"/>
+            </a:lnRef>
+            <a:fillRef idx="0">
+              <a:schemeClr val="accent1"/>
+            </a:fillRef>
+            <a:effectRef idx="0">
+              <a:schemeClr val="accent1"/>
+            </a:effectRef>
+            <a:fontRef idx="minor">
+              <a:schemeClr val="tx1"/>
+            </a:fontRef>
+          </p:style>
+        </p:cxnSp>
+        <p:cxnSp>
+          <p:nvCxnSpPr>
+            <p:cNvPr id="26" name="Straight Connector 25"/>
+            <p:cNvCxnSpPr/>
+            <p:nvPr/>
+          </p:nvCxnSpPr>
+          <p:spPr>
+            <a:xfrm flipH="1">
+              <a:off x="5269677" y="4122736"/>
+              <a:ext cx="15241" cy="479425"/>
+            </a:xfrm>
+            <a:prstGeom prst="line">
+              <a:avLst/>
+            </a:prstGeom>
+            <a:ln w="28575"/>
+          </p:spPr>
+          <p:style>
+            <a:lnRef idx="1">
+              <a:schemeClr val="accent1"/>
+            </a:lnRef>
+            <a:fillRef idx="0">
+              <a:schemeClr val="accent1"/>
+            </a:fillRef>
+            <a:effectRef idx="0">
+              <a:schemeClr val="accent1"/>
+            </a:effectRef>
+            <a:fontRef idx="minor">
+              <a:schemeClr val="tx1"/>
+            </a:fontRef>
+          </p:style>
+        </p:cxnSp>
+        <p:cxnSp>
+          <p:nvCxnSpPr>
+            <p:cNvPr id="27" name="Straight Connector 26"/>
+            <p:cNvCxnSpPr>
+              <a:stCxn id="13" idx="5"/>
+              <a:endCxn id="15" idx="1"/>
+            </p:cNvCxnSpPr>
+            <p:nvPr/>
+          </p:nvCxnSpPr>
+          <p:spPr>
+            <a:xfrm>
+              <a:off x="5382520" y="4101866"/>
+              <a:ext cx="536314" cy="521167"/>
+            </a:xfrm>
+            <a:prstGeom prst="line">
+              <a:avLst/>
+            </a:prstGeom>
+            <a:ln w="28575"/>
+          </p:spPr>
+          <p:style>
+            <a:lnRef idx="1">
+              <a:schemeClr val="accent1"/>
+            </a:lnRef>
+            <a:fillRef idx="0">
+              <a:schemeClr val="accent1"/>
+            </a:fillRef>
+            <a:effectRef idx="0">
+              <a:schemeClr val="accent1"/>
+            </a:effectRef>
+            <a:fontRef idx="minor">
+              <a:schemeClr val="tx1"/>
+            </a:fontRef>
+          </p:style>
+        </p:cxnSp>
+      </p:grpSp>
+    </p:spTree>
+    <p:extLst>
+      <p:ext uri="{BB962C8B-B14F-4D97-AF65-F5344CB8AC3E}">
+        <p14:creationId xmlns:p14="http://schemas.microsoft.com/office/powerpoint/2010/main" val="1578745613"/>
+      </p:ext>
+    </p:extLst>
+  </p:cSld>
+  <p:clrMapOvr>
+    <a:masterClrMapping/>
+  </p:clrMapOvr>
+  <p:timing>
+    <p:tnLst>
+      <p:par>
+        <p:cTn id="1" dur="indefinite" restart="never" nodeType="tmRoot"/>
+      </p:par>
+    </p:tnLst>
+  </p:timing>
+</p:sld>
+</file>
+
+<file path=ppt/slides/slide4.xml><?xml version="1.0" encoding="utf-8"?>
+<p:sld xmlns:a="http://schemas.openxmlformats.org/drawingml/2006/main" xmlns:r="http://schemas.openxmlformats.org/officeDocument/2006/relationships" xmlns:p="http://schemas.openxmlformats.org/presentationml/2006/main">
+  <p:cSld>
+    <p:spTree>
+      <p:nvGrpSpPr>
+        <p:cNvPr id="1" name=""/>
+        <p:cNvGrpSpPr/>
+        <p:nvPr/>
+      </p:nvGrpSpPr>
+      <p:grpSpPr>
+        <a:xfrm>
+          <a:off x="0" y="0"/>
+          <a:ext cx="0" cy="0"/>
+          <a:chOff x="0" y="0"/>
+          <a:chExt cx="0" cy="0"/>
+        </a:xfrm>
+      </p:grpSpPr>
+      <p:sp>
+        <p:nvSpPr>
+          <p:cNvPr id="2" name="Title 1"/>
+          <p:cNvSpPr>
+            <a:spLocks noGrp="1"/>
+          </p:cNvSpPr>
+          <p:nvPr>
+            <p:ph type="title"/>
+          </p:nvPr>
+        </p:nvSpPr>
+        <p:spPr/>
+        <p:txBody>
+          <a:bodyPr>
+            <a:normAutofit/>
+          </a:bodyPr>
+          <a:lstStyle/>
+          <a:p>
+            <a:r>
+              <a:rPr lang="en-US" sz="2800" dirty="0" smtClean="0"/>
+              <a:t>Applying depth-first search for Sudoku solver </a:t>
+            </a:r>
+            <a:endParaRPr lang="en-US" sz="2800" dirty="0"/>
+          </a:p>
+        </p:txBody>
+      </p:sp>
+      <p:sp>
+        <p:nvSpPr>
+          <p:cNvPr id="3" name="Content Placeholder 2"/>
+          <p:cNvSpPr>
+            <a:spLocks noGrp="1"/>
+          </p:cNvSpPr>
+          <p:nvPr>
+            <p:ph idx="1"/>
+          </p:nvPr>
+        </p:nvSpPr>
+        <p:spPr/>
+        <p:txBody>
+          <a:bodyPr>
+            <a:normAutofit/>
+          </a:bodyPr>
+          <a:lstStyle/>
+          <a:p>
+            <a:r>
+              <a:rPr lang="en-US" sz="2400" dirty="0" smtClean="0"/>
+              <a:t>Obtaining the distribution with </a:t>
+            </a:r>
+            <a:r>
+              <a:rPr lang="en-US" sz="2400" smtClean="0"/>
+              <a:t>possible assignments</a:t>
+            </a:r>
+            <a:endParaRPr lang="en-US" sz="2400" dirty="0"/>
+          </a:p>
+        </p:txBody>
+      </p:sp>
+    </p:spTree>
+    <p:extLst>
+      <p:ext uri="{BB962C8B-B14F-4D97-AF65-F5344CB8AC3E}">
+        <p14:creationId xmlns:p14="http://schemas.microsoft.com/office/powerpoint/2010/main" val="2947794346"/>
+      </p:ext>
+    </p:extLst>
+  </p:cSld>
+  <p:clrMapOvr>
+    <a:masterClrMapping/>
+  </p:clrMapOvr>
+  <p:timing>
+    <p:tnLst>
+      <p:par>
+        <p:cTn id="1" dur="indefinite" restart="never" nodeType="tmRoot"/>
+      </p:par>
+    </p:tnLst>
+  </p:timing>
+</p:sld>
+</file>
+
+<file path=ppt/slides/slide5.xml><?xml version="1.0" encoding="utf-8"?>
+<p:sld xmlns:a="http://schemas.openxmlformats.org/drawingml/2006/main" xmlns:r="http://schemas.openxmlformats.org/officeDocument/2006/relationships" xmlns:p="http://schemas.openxmlformats.org/presentationml/2006/main">
+  <p:cSld>
+    <p:spTree>
+      <p:nvGrpSpPr>
+        <p:cNvPr id="1" name=""/>
+        <p:cNvGrpSpPr/>
+        <p:nvPr/>
+      </p:nvGrpSpPr>
+      <p:grpSpPr>
+        <a:xfrm>
+          <a:off x="0" y="0"/>
+          <a:ext cx="0" cy="0"/>
+          <a:chOff x="0" y="0"/>
+          <a:chExt cx="0" cy="0"/>
+        </a:xfrm>
+      </p:grpSpPr>
+      <p:sp>
+        <p:nvSpPr>
+          <p:cNvPr id="2" name="Title 1"/>
+          <p:cNvSpPr>
+            <a:spLocks noGrp="1"/>
+          </p:cNvSpPr>
+          <p:nvPr>
+            <p:ph type="title"/>
+          </p:nvPr>
+        </p:nvSpPr>
+        <p:spPr/>
+        <p:txBody>
+          <a:bodyPr>
+            <a:normAutofit/>
+          </a:bodyPr>
+          <a:lstStyle/>
+          <a:p>
+            <a:r>
               <a:rPr lang="en-US" sz="2800" dirty="0" smtClean="0"/>
               <a:t>Different approach – Sudoku as finite group</a:t>
             </a:r>
@@ -4167,7 +5445,7 @@
 </p:sld>
 </file>
 
-<file path=ppt/slides/slide4.xml><?xml version="1.0" encoding="utf-8"?>
+<file path=ppt/slides/slide6.xml><?xml version="1.0" encoding="utf-8"?>
 <p:sld xmlns:a="http://schemas.openxmlformats.org/drawingml/2006/main" xmlns:r="http://schemas.openxmlformats.org/officeDocument/2006/relationships" xmlns:p="http://schemas.openxmlformats.org/presentationml/2006/main">
   <p:cSld>
     <p:spTree>

</xml_diff>

<commit_message>
Power point slides update
</commit_message>
<xml_diff>
--- a/Sudoku/Sudoku  solving the puzzle validating uniqnuess.pptx
+++ b/Sudoku/Sudoku  solving the puzzle validating uniqnuess.pptx
@@ -17,7 +17,8 @@
     <p:sldId id="267" r:id="rId11"/>
     <p:sldId id="258" r:id="rId12"/>
     <p:sldId id="268" r:id="rId13"/>
-    <p:sldId id="259" r:id="rId14"/>
+    <p:sldId id="269" r:id="rId14"/>
+    <p:sldId id="259" r:id="rId15"/>
   </p:sldIdLst>
   <p:sldSz cx="9144000" cy="6858000" type="screen4x3"/>
   <p:notesSz cx="6858000" cy="9144000"/>
@@ -231,11 +232,11 @@
           <c:showBubbleSize val="0"/>
         </c:dLbls>
         <c:gapWidth val="150"/>
-        <c:axId val="45172224"/>
-        <c:axId val="45173760"/>
+        <c:axId val="40841984"/>
+        <c:axId val="40843520"/>
       </c:barChart>
       <c:catAx>
-        <c:axId val="45172224"/>
+        <c:axId val="40841984"/>
         <c:scaling>
           <c:orientation val="minMax"/>
         </c:scaling>
@@ -245,7 +246,7 @@
         <c:majorTickMark val="out"/>
         <c:minorTickMark val="none"/>
         <c:tickLblPos val="nextTo"/>
-        <c:crossAx val="45173760"/>
+        <c:crossAx val="40843520"/>
         <c:crosses val="autoZero"/>
         <c:auto val="1"/>
         <c:lblAlgn val="ctr"/>
@@ -253,7 +254,7 @@
         <c:noMultiLvlLbl val="0"/>
       </c:catAx>
       <c:valAx>
-        <c:axId val="45173760"/>
+        <c:axId val="40843520"/>
         <c:scaling>
           <c:orientation val="minMax"/>
         </c:scaling>
@@ -264,7 +265,7 @@
         <c:majorTickMark val="out"/>
         <c:minorTickMark val="none"/>
         <c:tickLblPos val="nextTo"/>
-        <c:crossAx val="45172224"/>
+        <c:crossAx val="40841984"/>
         <c:crosses val="autoZero"/>
         <c:crossBetween val="between"/>
       </c:valAx>
@@ -401,11 +402,11 @@
           <c:showBubbleSize val="0"/>
         </c:dLbls>
         <c:gapWidth val="150"/>
-        <c:axId val="85372288"/>
-        <c:axId val="85386368"/>
+        <c:axId val="122606720"/>
+        <c:axId val="122608256"/>
       </c:barChart>
       <c:catAx>
-        <c:axId val="85372288"/>
+        <c:axId val="122606720"/>
         <c:scaling>
           <c:orientation val="minMax"/>
         </c:scaling>
@@ -415,7 +416,7 @@
         <c:majorTickMark val="out"/>
         <c:minorTickMark val="none"/>
         <c:tickLblPos val="nextTo"/>
-        <c:crossAx val="85386368"/>
+        <c:crossAx val="122608256"/>
         <c:crosses val="autoZero"/>
         <c:auto val="1"/>
         <c:lblAlgn val="ctr"/>
@@ -423,7 +424,7 @@
         <c:noMultiLvlLbl val="0"/>
       </c:catAx>
       <c:valAx>
-        <c:axId val="85386368"/>
+        <c:axId val="122608256"/>
         <c:scaling>
           <c:orientation val="minMax"/>
         </c:scaling>
@@ -434,7 +435,7 @@
         <c:majorTickMark val="out"/>
         <c:minorTickMark val="none"/>
         <c:tickLblPos val="nextTo"/>
-        <c:crossAx val="85372288"/>
+        <c:crossAx val="122606720"/>
         <c:crosses val="autoZero"/>
         <c:crossBetween val="between"/>
       </c:valAx>
@@ -571,11 +572,11 @@
           <c:showBubbleSize val="0"/>
         </c:dLbls>
         <c:gapWidth val="150"/>
-        <c:axId val="141760384"/>
-        <c:axId val="141761920"/>
+        <c:axId val="120227328"/>
+        <c:axId val="126980480"/>
       </c:barChart>
       <c:catAx>
-        <c:axId val="141760384"/>
+        <c:axId val="120227328"/>
         <c:scaling>
           <c:orientation val="minMax"/>
         </c:scaling>
@@ -595,7 +596,7 @@
             <a:endParaRPr lang="en-US"/>
           </a:p>
         </c:txPr>
-        <c:crossAx val="141761920"/>
+        <c:crossAx val="126980480"/>
         <c:crosses val="autoZero"/>
         <c:auto val="1"/>
         <c:lblAlgn val="ctr"/>
@@ -603,7 +604,7 @@
         <c:noMultiLvlLbl val="0"/>
       </c:catAx>
       <c:valAx>
-        <c:axId val="141761920"/>
+        <c:axId val="126980480"/>
         <c:scaling>
           <c:orientation val="minMax"/>
         </c:scaling>
@@ -624,7 +625,7 @@
             <a:endParaRPr lang="en-US"/>
           </a:p>
         </c:txPr>
-        <c:crossAx val="141760384"/>
+        <c:crossAx val="120227328"/>
         <c:crosses val="autoZero"/>
         <c:crossBetween val="between"/>
       </c:valAx>
@@ -761,11 +762,11 @@
           <c:showBubbleSize val="0"/>
         </c:dLbls>
         <c:gapWidth val="150"/>
-        <c:axId val="121144832"/>
-        <c:axId val="121146752"/>
+        <c:axId val="126983168"/>
+        <c:axId val="127410944"/>
       </c:barChart>
       <c:catAx>
-        <c:axId val="121144832"/>
+        <c:axId val="126983168"/>
         <c:scaling>
           <c:orientation val="minMax"/>
         </c:scaling>
@@ -785,7 +786,7 @@
             <a:endParaRPr lang="en-US"/>
           </a:p>
         </c:txPr>
-        <c:crossAx val="121146752"/>
+        <c:crossAx val="127410944"/>
         <c:crosses val="autoZero"/>
         <c:auto val="1"/>
         <c:lblAlgn val="ctr"/>
@@ -793,7 +794,7 @@
         <c:noMultiLvlLbl val="0"/>
       </c:catAx>
       <c:valAx>
-        <c:axId val="121146752"/>
+        <c:axId val="127410944"/>
         <c:scaling>
           <c:orientation val="minMax"/>
         </c:scaling>
@@ -814,7 +815,7 @@
             <a:endParaRPr lang="en-US"/>
           </a:p>
         </c:txPr>
-        <c:crossAx val="121144832"/>
+        <c:crossAx val="126983168"/>
         <c:crosses val="autoZero"/>
         <c:crossBetween val="between"/>
       </c:valAx>
@@ -4047,7 +4048,6 @@
               <a:rPr lang="en-US" sz="2800" dirty="0"/>
               <a:t>Generating puzzles</a:t>
             </a:r>
-            <a:endParaRPr lang="en-US" sz="2800" dirty="0"/>
           </a:p>
         </p:txBody>
       </p:sp>
@@ -4078,25 +4078,8 @@
             </a:r>
             <a:r>
               <a:rPr lang="en-US" sz="2400" dirty="0" smtClean="0"/>
-              <a:t> different </a:t>
-            </a:r>
-            <a:r>
-              <a:rPr lang="en-US" sz="2400" dirty="0" smtClean="0"/>
-              <a:t>solutions </a:t>
-            </a:r>
-            <a:r>
-              <a:rPr lang="en-US" sz="2400" dirty="0" smtClean="0"/>
-              <a:t>but only 5,472,730,538 of those are not congruent with each other with respect to rotation, reflection, permutation and relabeling</a:t>
-            </a:r>
-            <a:r>
-              <a:rPr lang="en-US" sz="2400" dirty="0" smtClean="0"/>
-              <a:t>. How to write a generator which will be able to generate any one of </a:t>
-            </a:r>
-            <a:r>
-              <a:rPr lang="en-US" sz="2400" dirty="0" smtClean="0"/>
-              <a:t>those essential 5,472,730,538 puzzles.</a:t>
-            </a:r>
-            <a:endParaRPr lang="en-US" sz="2400" dirty="0" smtClean="0"/>
+              <a:t> different solutions but only 5,472,730,538 of those are not congruent with each other with respect to rotation, reflection, permutation and relabeling. How to write a generator which will be able to generate any one of those essential 5,472,730,538 puzzles.</a:t>
+            </a:r>
           </a:p>
           <a:p>
             <a:r>
@@ -4206,18 +4189,60 @@
         <p:spPr/>
         <p:txBody>
           <a:bodyPr>
-            <a:normAutofit/>
+            <a:normAutofit fontScale="92500" lnSpcReduction="10000"/>
           </a:bodyPr>
           <a:lstStyle/>
           <a:p>
             <a:r>
               <a:rPr lang="en-US" sz="2400" dirty="0" smtClean="0"/>
-              <a:t>I chose different approach – generate the puzzle line by line randomizing it </a:t>
-            </a:r>
-            <a:r>
-              <a:rPr lang="en-US" sz="2400" smtClean="0"/>
-              <a:t>whenever possible.</a:t>
-            </a:r>
+              <a:t>I chose different approach – generate the </a:t>
+            </a:r>
+            <a:r>
+              <a:rPr lang="en-US" sz="2400" dirty="0" smtClean="0"/>
+              <a:t>solved puzzle </a:t>
+            </a:r>
+            <a:r>
+              <a:rPr lang="en-US" sz="2400" dirty="0" smtClean="0"/>
+              <a:t>line by line randomizing it whenever possible</a:t>
+            </a:r>
+            <a:r>
+              <a:rPr lang="en-US" sz="2400" dirty="0" smtClean="0"/>
+              <a:t>. If a newly assigned value leads to infeasible configuration then backtrack until find set of assignments not violating the row, column and region constraints.</a:t>
+            </a:r>
+          </a:p>
+          <a:p>
+            <a:r>
+              <a:rPr lang="en-US" sz="2400" dirty="0" smtClean="0"/>
+              <a:t>The next step: make holes into the newly generated solved puzzle one row at a time one hole at a time in random. After making one pass through all of the rows stop and evaluate the grade of the puzzle and if the solution is unique. If the solution is unique but the grade is lower than the requested grade make another pass. If the solution is not unique undo last pass and make another pass. Repeat until finding a configuration with unique solution and a grade matching the requested grade.</a:t>
+            </a:r>
+          </a:p>
+          <a:p>
+            <a:pPr marL="0" indent="0">
+              <a:buNone/>
+            </a:pPr>
+            <a:r>
+              <a:rPr lang="en-US" sz="2400" dirty="0"/>
+              <a:t> </a:t>
+            </a:r>
+            <a:endParaRPr lang="en-US" sz="2400" dirty="0" smtClean="0"/>
+          </a:p>
+          <a:p>
+            <a:pPr marL="0" indent="0">
+              <a:buNone/>
+            </a:pPr>
+            <a:r>
+              <a:rPr lang="en-US" sz="2400" dirty="0"/>
+              <a:t> </a:t>
+            </a:r>
+            <a:r>
+              <a:rPr lang="en-US" sz="2400" dirty="0" smtClean="0"/>
+              <a:t>   </a:t>
+            </a:r>
+          </a:p>
+          <a:p>
+            <a:endParaRPr lang="en-US" sz="2400" dirty="0" smtClean="0"/>
+          </a:p>
+          <a:p>
             <a:endParaRPr lang="en-US" sz="2400" dirty="0"/>
           </a:p>
         </p:txBody>
@@ -4277,6 +4302,102 @@
           <a:lstStyle/>
           <a:p>
             <a:r>
+              <a:rPr lang="en-US" sz="2800" dirty="0"/>
+              <a:t>Generating puzzles</a:t>
+            </a:r>
+          </a:p>
+        </p:txBody>
+      </p:sp>
+      <p:sp>
+        <p:nvSpPr>
+          <p:cNvPr id="3" name="Content Placeholder 2"/>
+          <p:cNvSpPr>
+            <a:spLocks noGrp="1"/>
+          </p:cNvSpPr>
+          <p:nvPr>
+            <p:ph idx="1"/>
+          </p:nvPr>
+        </p:nvSpPr>
+        <p:spPr/>
+        <p:txBody>
+          <a:bodyPr>
+            <a:normAutofit/>
+          </a:bodyPr>
+          <a:lstStyle/>
+          <a:p>
+            <a:r>
+              <a:rPr lang="en-US" sz="2400" dirty="0" smtClean="0"/>
+              <a:t>Problems with my approach for making holes – this is not true backtracking algorithm and there is no guarantee it will find a puzzle with the  requested grade for the given max amount of iterations.</a:t>
+            </a:r>
+          </a:p>
+          <a:p>
+            <a:r>
+              <a:rPr lang="en-US" sz="2400" dirty="0" smtClean="0"/>
+              <a:t>Next step: implement a true backtracking algorithm for making holes into the generated solved puzzle which will explore all possible combinations at the current level before </a:t>
+            </a:r>
+            <a:r>
+              <a:rPr lang="en-US" sz="2400" smtClean="0"/>
+              <a:t>it backtracks. </a:t>
+            </a:r>
+            <a:endParaRPr lang="en-US" sz="2400" dirty="0"/>
+          </a:p>
+        </p:txBody>
+      </p:sp>
+    </p:spTree>
+    <p:extLst>
+      <p:ext uri="{BB962C8B-B14F-4D97-AF65-F5344CB8AC3E}">
+        <p14:creationId xmlns:p14="http://schemas.microsoft.com/office/powerpoint/2010/main" val="50479229"/>
+      </p:ext>
+    </p:extLst>
+  </p:cSld>
+  <p:clrMapOvr>
+    <a:masterClrMapping/>
+  </p:clrMapOvr>
+  <p:timing>
+    <p:tnLst>
+      <p:par>
+        <p:cTn id="1" dur="indefinite" restart="never" nodeType="tmRoot"/>
+      </p:par>
+    </p:tnLst>
+  </p:timing>
+</p:sld>
+</file>
+
+<file path=ppt/slides/slide14.xml><?xml version="1.0" encoding="utf-8"?>
+<p:sld xmlns:a="http://schemas.openxmlformats.org/drawingml/2006/main" xmlns:r="http://schemas.openxmlformats.org/officeDocument/2006/relationships" xmlns:p="http://schemas.openxmlformats.org/presentationml/2006/main">
+  <p:cSld>
+    <p:spTree>
+      <p:nvGrpSpPr>
+        <p:cNvPr id="1" name=""/>
+        <p:cNvGrpSpPr/>
+        <p:nvPr/>
+      </p:nvGrpSpPr>
+      <p:grpSpPr>
+        <a:xfrm>
+          <a:off x="0" y="0"/>
+          <a:ext cx="0" cy="0"/>
+          <a:chOff x="0" y="0"/>
+          <a:chExt cx="0" cy="0"/>
+        </a:xfrm>
+      </p:grpSpPr>
+      <p:sp>
+        <p:nvSpPr>
+          <p:cNvPr id="2" name="Title 1"/>
+          <p:cNvSpPr>
+            <a:spLocks noGrp="1"/>
+          </p:cNvSpPr>
+          <p:nvPr>
+            <p:ph type="title"/>
+          </p:nvPr>
+        </p:nvSpPr>
+        <p:spPr/>
+        <p:txBody>
+          <a:bodyPr>
+            <a:normAutofit/>
+          </a:bodyPr>
+          <a:lstStyle/>
+          <a:p>
+            <a:r>
               <a:rPr lang="en-US" sz="2800" dirty="0" smtClean="0"/>
               <a:t>Another approach: Sudoku as linear programming problem</a:t>
             </a:r>
@@ -6433,19 +6554,7 @@
           <a:p>
             <a:r>
               <a:rPr lang="en-US" sz="2800" dirty="0" smtClean="0"/>
-              <a:t>Applying depth-first search </a:t>
-            </a:r>
-            <a:r>
-              <a:rPr lang="en-US" sz="2800" dirty="0" smtClean="0"/>
-              <a:t>in</a:t>
-            </a:r>
-            <a:r>
-              <a:rPr lang="en-US" sz="2800" dirty="0" smtClean="0"/>
-              <a:t> </a:t>
-            </a:r>
-            <a:r>
-              <a:rPr lang="en-US" sz="2800" dirty="0" smtClean="0"/>
-              <a:t>Sudoku solver </a:t>
+              <a:t>Applying depth-first search in Sudoku solver </a:t>
             </a:r>
             <a:endParaRPr lang="en-US" sz="2800" dirty="0"/>
           </a:p>
@@ -6475,11 +6584,7 @@
           <a:p>
             <a:r>
               <a:rPr lang="en-US" sz="2400" dirty="0" smtClean="0"/>
-              <a:t>Obtaining the distribution with possible </a:t>
-            </a:r>
-            <a:r>
-              <a:rPr lang="en-US" sz="2400" dirty="0" smtClean="0"/>
-              <a:t>assignments</a:t>
+              <a:t>Obtaining the distribution with possible assignments</a:t>
             </a:r>
           </a:p>
           <a:p>
@@ -6973,19 +7078,7 @@
           <a:p>
             <a:r>
               <a:rPr lang="en-US" sz="2800" dirty="0" smtClean="0"/>
-              <a:t>Applying depth-first search </a:t>
-            </a:r>
-            <a:r>
-              <a:rPr lang="en-US" sz="2800" dirty="0" smtClean="0"/>
-              <a:t>in</a:t>
-            </a:r>
-            <a:r>
-              <a:rPr lang="en-US" sz="2800" dirty="0" smtClean="0"/>
-              <a:t> </a:t>
-            </a:r>
-            <a:r>
-              <a:rPr lang="en-US" sz="2800" dirty="0" smtClean="0"/>
-              <a:t>Sudoku solver </a:t>
+              <a:t>Applying depth-first search in Sudoku solver </a:t>
             </a:r>
             <a:endParaRPr lang="en-US" sz="2800" dirty="0"/>
           </a:p>
@@ -7119,7 +7212,6 @@
                 <a:rPr lang="en-US" dirty="0"/>
                 <a:t>4</a:t>
               </a:r>
-              <a:endParaRPr lang="en-US" dirty="0"/>
             </a:p>
           </p:txBody>
         </p:sp>
@@ -7294,7 +7386,6 @@
                 <a:rPr lang="en-US" dirty="0"/>
                 <a:t>4</a:t>
               </a:r>
-              <a:endParaRPr lang="en-US" dirty="0"/>
             </a:p>
           </p:txBody>
         </p:sp>
@@ -7382,7 +7473,6 @@
                 <a:rPr lang="en-US" dirty="0"/>
                 <a:t>3</a:t>
               </a:r>
-              <a:endParaRPr lang="en-US" dirty="0"/>
             </a:p>
           </p:txBody>
         </p:sp>
@@ -7426,7 +7516,6 @@
                 <a:rPr lang="en-US" dirty="0"/>
                 <a:t>5</a:t>
               </a:r>
-              <a:endParaRPr lang="en-US" dirty="0"/>
             </a:p>
           </p:txBody>
         </p:sp>
@@ -7470,7 +7559,6 @@
                 <a:rPr lang="en-US" dirty="0"/>
                 <a:t>5</a:t>
               </a:r>
-              <a:endParaRPr lang="en-US" dirty="0"/>
             </a:p>
           </p:txBody>
         </p:sp>
@@ -7514,7 +7602,6 @@
                 <a:rPr lang="en-US" dirty="0"/>
                 <a:t>3</a:t>
               </a:r>
-              <a:endParaRPr lang="en-US" dirty="0"/>
             </a:p>
           </p:txBody>
         </p:sp>
@@ -7558,7 +7645,6 @@
                 <a:rPr lang="en-US" dirty="0"/>
                 <a:t>3</a:t>
               </a:r>
-              <a:endParaRPr lang="en-US" dirty="0"/>
             </a:p>
           </p:txBody>
         </p:sp>
@@ -7602,7 +7688,6 @@
                 <a:rPr lang="en-US" dirty="0"/>
                 <a:t>5</a:t>
               </a:r>
-              <a:endParaRPr lang="en-US" dirty="0"/>
             </a:p>
           </p:txBody>
         </p:sp>
@@ -7646,7 +7731,6 @@
                 <a:rPr lang="en-US" dirty="0"/>
                 <a:t>3</a:t>
               </a:r>
-              <a:endParaRPr lang="en-US" dirty="0"/>
             </a:p>
           </p:txBody>
         </p:sp>
@@ -7690,7 +7774,6 @@
                 <a:rPr lang="en-US" dirty="0"/>
                 <a:t>5</a:t>
               </a:r>
-              <a:endParaRPr lang="en-US" dirty="0"/>
             </a:p>
           </p:txBody>
         </p:sp>
@@ -8866,7 +8949,6 @@
                 <a:rPr lang="en-US" dirty="0"/>
                 <a:t>4</a:t>
               </a:r>
-              <a:endParaRPr lang="en-US" dirty="0"/>
             </a:p>
           </p:txBody>
         </p:sp>
@@ -9041,7 +9123,6 @@
                 <a:rPr lang="en-US" dirty="0"/>
                 <a:t>4</a:t>
               </a:r>
-              <a:endParaRPr lang="en-US" dirty="0"/>
             </a:p>
           </p:txBody>
         </p:sp>
@@ -9129,7 +9210,6 @@
                 <a:rPr lang="en-US" dirty="0"/>
                 <a:t>3</a:t>
               </a:r>
-              <a:endParaRPr lang="en-US" dirty="0"/>
             </a:p>
           </p:txBody>
         </p:sp>
@@ -9173,7 +9253,6 @@
                 <a:rPr lang="en-US" dirty="0"/>
                 <a:t>5</a:t>
               </a:r>
-              <a:endParaRPr lang="en-US" dirty="0"/>
             </a:p>
           </p:txBody>
         </p:sp>
@@ -9217,7 +9296,6 @@
                 <a:rPr lang="en-US" dirty="0"/>
                 <a:t>5</a:t>
               </a:r>
-              <a:endParaRPr lang="en-US" dirty="0"/>
             </a:p>
           </p:txBody>
         </p:sp>
@@ -9261,7 +9339,6 @@
                 <a:rPr lang="en-US" dirty="0"/>
                 <a:t>3</a:t>
               </a:r>
-              <a:endParaRPr lang="en-US" dirty="0"/>
             </a:p>
           </p:txBody>
         </p:sp>
@@ -9305,7 +9382,6 @@
                 <a:rPr lang="en-US" dirty="0"/>
                 <a:t>3</a:t>
               </a:r>
-              <a:endParaRPr lang="en-US" dirty="0"/>
             </a:p>
           </p:txBody>
         </p:sp>
@@ -9349,7 +9425,6 @@
                 <a:rPr lang="en-US" dirty="0"/>
                 <a:t>5</a:t>
               </a:r>
-              <a:endParaRPr lang="en-US" dirty="0"/>
             </a:p>
           </p:txBody>
         </p:sp>
@@ -9393,7 +9468,6 @@
                 <a:rPr lang="en-US" dirty="0"/>
                 <a:t>3</a:t>
               </a:r>
-              <a:endParaRPr lang="en-US" dirty="0"/>
             </a:p>
           </p:txBody>
         </p:sp>
@@ -9437,7 +9511,6 @@
                 <a:rPr lang="en-US" dirty="0"/>
                 <a:t>5</a:t>
               </a:r>
-              <a:endParaRPr lang="en-US" dirty="0"/>
             </a:p>
           </p:txBody>
         </p:sp>

</xml_diff>